<commit_message>
Final Version before session
</commit_message>
<xml_diff>
--- a/Version Control .pptx
+++ b/Version Control .pptx
@@ -5,37 +5,36 @@
     <p:sldMasterId id="2147483971" r:id="rId1"/>
   </p:sldMasterIdLst>
   <p:notesMasterIdLst>
-    <p:notesMasterId r:id="rId30"/>
+    <p:notesMasterId r:id="rId29"/>
   </p:notesMasterIdLst>
   <p:sldIdLst>
     <p:sldId id="256" r:id="rId2"/>
     <p:sldId id="283" r:id="rId3"/>
-    <p:sldId id="257" r:id="rId4"/>
-    <p:sldId id="258" r:id="rId5"/>
-    <p:sldId id="259" r:id="rId6"/>
-    <p:sldId id="260" r:id="rId7"/>
-    <p:sldId id="261" r:id="rId8"/>
-    <p:sldId id="262" r:id="rId9"/>
-    <p:sldId id="266" r:id="rId10"/>
-    <p:sldId id="267" r:id="rId11"/>
-    <p:sldId id="264" r:id="rId12"/>
-    <p:sldId id="265" r:id="rId13"/>
-    <p:sldId id="269" r:id="rId14"/>
-    <p:sldId id="270" r:id="rId15"/>
-    <p:sldId id="272" r:id="rId16"/>
-    <p:sldId id="271" r:id="rId17"/>
-    <p:sldId id="273" r:id="rId18"/>
-    <p:sldId id="274" r:id="rId19"/>
-    <p:sldId id="275" r:id="rId20"/>
-    <p:sldId id="276" r:id="rId21"/>
-    <p:sldId id="277" r:id="rId22"/>
-    <p:sldId id="278" r:id="rId23"/>
-    <p:sldId id="279" r:id="rId24"/>
-    <p:sldId id="280" r:id="rId25"/>
-    <p:sldId id="286" r:id="rId26"/>
-    <p:sldId id="284" r:id="rId27"/>
-    <p:sldId id="285" r:id="rId28"/>
-    <p:sldId id="282" r:id="rId29"/>
+    <p:sldId id="258" r:id="rId4"/>
+    <p:sldId id="259" r:id="rId5"/>
+    <p:sldId id="260" r:id="rId6"/>
+    <p:sldId id="261" r:id="rId7"/>
+    <p:sldId id="262" r:id="rId8"/>
+    <p:sldId id="266" r:id="rId9"/>
+    <p:sldId id="267" r:id="rId10"/>
+    <p:sldId id="264" r:id="rId11"/>
+    <p:sldId id="265" r:id="rId12"/>
+    <p:sldId id="269" r:id="rId13"/>
+    <p:sldId id="270" r:id="rId14"/>
+    <p:sldId id="272" r:id="rId15"/>
+    <p:sldId id="271" r:id="rId16"/>
+    <p:sldId id="273" r:id="rId17"/>
+    <p:sldId id="274" r:id="rId18"/>
+    <p:sldId id="275" r:id="rId19"/>
+    <p:sldId id="276" r:id="rId20"/>
+    <p:sldId id="277" r:id="rId21"/>
+    <p:sldId id="278" r:id="rId22"/>
+    <p:sldId id="279" r:id="rId23"/>
+    <p:sldId id="280" r:id="rId24"/>
+    <p:sldId id="286" r:id="rId25"/>
+    <p:sldId id="284" r:id="rId26"/>
+    <p:sldId id="285" r:id="rId27"/>
+    <p:sldId id="282" r:id="rId28"/>
   </p:sldIdLst>
   <p:sldSz cx="12192000" cy="6858000"/>
   <p:notesSz cx="6858000" cy="9144000"/>
@@ -224,7 +223,7 @@
           <a:p>
             <a:fld id="{4E13F755-3947-4186-A93C-7B32A1A9857A}" type="datetimeFigureOut">
               <a:rPr lang="en-US" smtClean="0"/>
-              <a:t>12/9/2022</a:t>
+              <a:t>12/10/2022</a:t>
             </a:fld>
             <a:endParaRPr lang="en-US"/>
           </a:p>
@@ -641,7 +640,7 @@
           <a:p>
             <a:fld id="{F2F27AD6-11B2-4587-8AC9-BE4254E89FB6}" type="slidenum">
               <a:rPr lang="en-US" smtClean="0"/>
-              <a:t>5</a:t>
+              <a:t>4</a:t>
             </a:fld>
             <a:endParaRPr lang="en-US"/>
           </a:p>
@@ -651,6 +650,90 @@
     <p:extLst>
       <p:ext uri="{BB962C8B-B14F-4D97-AF65-F5344CB8AC3E}">
         <p14:creationId xmlns:p14="http://schemas.microsoft.com/office/powerpoint/2010/main" val="3928317328"/>
+      </p:ext>
+    </p:extLst>
+  </p:cSld>
+  <p:clrMapOvr>
+    <a:masterClrMapping/>
+  </p:clrMapOvr>
+</p:notes>
+</file>
+
+<file path=ppt/notesSlides/notesSlide3.xml><?xml version="1.0" encoding="utf-8"?>
+<p:notes xmlns:a="http://schemas.openxmlformats.org/drawingml/2006/main" xmlns:r="http://schemas.openxmlformats.org/officeDocument/2006/relationships" xmlns:p="http://schemas.openxmlformats.org/presentationml/2006/main">
+  <p:cSld>
+    <p:spTree>
+      <p:nvGrpSpPr>
+        <p:cNvPr id="1" name=""/>
+        <p:cNvGrpSpPr/>
+        <p:nvPr/>
+      </p:nvGrpSpPr>
+      <p:grpSpPr>
+        <a:xfrm>
+          <a:off x="0" y="0"/>
+          <a:ext cx="0" cy="0"/>
+          <a:chOff x="0" y="0"/>
+          <a:chExt cx="0" cy="0"/>
+        </a:xfrm>
+      </p:grpSpPr>
+      <p:sp>
+        <p:nvSpPr>
+          <p:cNvPr id="2" name="Slide Image Placeholder 1"/>
+          <p:cNvSpPr>
+            <a:spLocks noGrp="1" noRot="1" noChangeAspect="1"/>
+          </p:cNvSpPr>
+          <p:nvPr>
+            <p:ph type="sldImg"/>
+          </p:nvPr>
+        </p:nvSpPr>
+        <p:spPr/>
+      </p:sp>
+      <p:sp>
+        <p:nvSpPr>
+          <p:cNvPr id="3" name="Notes Placeholder 2"/>
+          <p:cNvSpPr>
+            <a:spLocks noGrp="1"/>
+          </p:cNvSpPr>
+          <p:nvPr>
+            <p:ph type="body" idx="1"/>
+          </p:nvPr>
+        </p:nvSpPr>
+        <p:spPr/>
+        <p:txBody>
+          <a:bodyPr/>
+          <a:lstStyle/>
+          <a:p>
+            <a:endParaRPr lang="en-US" dirty="0"/>
+          </a:p>
+        </p:txBody>
+      </p:sp>
+      <p:sp>
+        <p:nvSpPr>
+          <p:cNvPr id="4" name="Slide Number Placeholder 3"/>
+          <p:cNvSpPr>
+            <a:spLocks noGrp="1"/>
+          </p:cNvSpPr>
+          <p:nvPr>
+            <p:ph type="sldNum" sz="quarter" idx="10"/>
+          </p:nvPr>
+        </p:nvSpPr>
+        <p:spPr/>
+        <p:txBody>
+          <a:bodyPr/>
+          <a:lstStyle/>
+          <a:p>
+            <a:fld id="{F2F27AD6-11B2-4587-8AC9-BE4254E89FB6}" type="slidenum">
+              <a:rPr lang="en-US" smtClean="0"/>
+              <a:t>6</a:t>
+            </a:fld>
+            <a:endParaRPr lang="en-US"/>
+          </a:p>
+        </p:txBody>
+      </p:sp>
+    </p:spTree>
+    <p:extLst>
+      <p:ext uri="{BB962C8B-B14F-4D97-AF65-F5344CB8AC3E}">
+        <p14:creationId xmlns:p14="http://schemas.microsoft.com/office/powerpoint/2010/main" val="2111262996"/>
       </p:ext>
     </p:extLst>
   </p:cSld>
@@ -1063,7 +1146,7 @@
           <a:p>
             <a:fld id="{0CF7F4BD-A53D-49E6-8074-9E186B0C9C30}" type="datetimeFigureOut">
               <a:rPr lang="en-US" smtClean="0"/>
-              <a:t>12/9/2022</a:t>
+              <a:t>12/10/2022</a:t>
             </a:fld>
             <a:endParaRPr lang="en-US"/>
           </a:p>
@@ -1242,7 +1325,7 @@
           <a:p>
             <a:fld id="{0CF7F4BD-A53D-49E6-8074-9E186B0C9C30}" type="datetimeFigureOut">
               <a:rPr lang="en-US" smtClean="0"/>
-              <a:t>12/9/2022</a:t>
+              <a:t>12/10/2022</a:t>
             </a:fld>
             <a:endParaRPr lang="en-US"/>
           </a:p>
@@ -1422,7 +1505,7 @@
           <a:p>
             <a:fld id="{0CF7F4BD-A53D-49E6-8074-9E186B0C9C30}" type="datetimeFigureOut">
               <a:rPr lang="en-US" smtClean="0"/>
-              <a:t>12/9/2022</a:t>
+              <a:t>12/10/2022</a:t>
             </a:fld>
             <a:endParaRPr lang="en-US"/>
           </a:p>
@@ -1592,7 +1675,7 @@
           <a:p>
             <a:fld id="{0CF7F4BD-A53D-49E6-8074-9E186B0C9C30}" type="datetimeFigureOut">
               <a:rPr lang="en-US" smtClean="0"/>
-              <a:t>12/9/2022</a:t>
+              <a:t>12/10/2022</a:t>
             </a:fld>
             <a:endParaRPr lang="en-US"/>
           </a:p>
@@ -1905,7 +1988,7 @@
           <a:p>
             <a:fld id="{0CF7F4BD-A53D-49E6-8074-9E186B0C9C30}" type="datetimeFigureOut">
               <a:rPr lang="en-US" smtClean="0"/>
-              <a:t>12/9/2022</a:t>
+              <a:t>12/10/2022</a:t>
             </a:fld>
             <a:endParaRPr lang="en-US"/>
           </a:p>
@@ -2291,7 +2374,7 @@
           <a:p>
             <a:fld id="{0CF7F4BD-A53D-49E6-8074-9E186B0C9C30}" type="datetimeFigureOut">
               <a:rPr lang="en-US" smtClean="0"/>
-              <a:t>12/9/2022</a:t>
+              <a:t>12/10/2022</a:t>
             </a:fld>
             <a:endParaRPr lang="en-US"/>
           </a:p>
@@ -2725,7 +2808,7 @@
           <a:p>
             <a:fld id="{0CF7F4BD-A53D-49E6-8074-9E186B0C9C30}" type="datetimeFigureOut">
               <a:rPr lang="en-US" smtClean="0"/>
-              <a:t>12/9/2022</a:t>
+              <a:t>12/10/2022</a:t>
             </a:fld>
             <a:endParaRPr lang="en-US"/>
           </a:p>
@@ -2843,7 +2926,7 @@
           <a:p>
             <a:fld id="{0CF7F4BD-A53D-49E6-8074-9E186B0C9C30}" type="datetimeFigureOut">
               <a:rPr lang="en-US" smtClean="0"/>
-              <a:t>12/9/2022</a:t>
+              <a:t>12/10/2022</a:t>
             </a:fld>
             <a:endParaRPr lang="en-US"/>
           </a:p>
@@ -2938,7 +3021,7 @@
           <a:p>
             <a:fld id="{0CF7F4BD-A53D-49E6-8074-9E186B0C9C30}" type="datetimeFigureOut">
               <a:rPr lang="en-US" smtClean="0"/>
-              <a:t>12/9/2022</a:t>
+              <a:t>12/10/2022</a:t>
             </a:fld>
             <a:endParaRPr lang="en-US"/>
           </a:p>
@@ -3288,7 +3371,7 @@
           <a:p>
             <a:fld id="{0CF7F4BD-A53D-49E6-8074-9E186B0C9C30}" type="datetimeFigureOut">
               <a:rPr lang="en-US" smtClean="0"/>
-              <a:t>12/9/2022</a:t>
+              <a:t>12/10/2022</a:t>
             </a:fld>
             <a:endParaRPr lang="en-US"/>
           </a:p>
@@ -3713,7 +3796,7 @@
           <a:p>
             <a:fld id="{0CF7F4BD-A53D-49E6-8074-9E186B0C9C30}" type="datetimeFigureOut">
               <a:rPr lang="en-US" smtClean="0"/>
-              <a:t>12/9/2022</a:t>
+              <a:t>12/10/2022</a:t>
             </a:fld>
             <a:endParaRPr lang="en-US"/>
           </a:p>
@@ -3994,7 +4077,7 @@
           <a:p>
             <a:fld id="{0CF7F4BD-A53D-49E6-8074-9E186B0C9C30}" type="datetimeFigureOut">
               <a:rPr lang="en-US" smtClean="0"/>
-              <a:t>12/9/2022</a:t>
+              <a:t>12/10/2022</a:t>
             </a:fld>
             <a:endParaRPr lang="en-US"/>
           </a:p>
@@ -4602,26 +4685,14 @@
             </a:br>
             <a:r>
               <a:rPr lang="en-US" sz="4800" dirty="0" smtClean="0"/>
-              <a:t>Version </a:t>
-            </a:r>
-            <a:r>
-              <a:rPr lang="en-US" sz="4800" dirty="0" smtClean="0"/>
-              <a:t>Control </a:t>
-            </a:r>
-            <a:r>
-              <a:rPr lang="en-US" sz="4800" dirty="0" smtClean="0"/>
-              <a:t/>
+              <a:t>Version Control </a:t>
             </a:r>
             <a:br>
               <a:rPr lang="en-US" sz="4800" dirty="0" smtClean="0"/>
             </a:br>
             <a:r>
               <a:rPr lang="en-US" sz="3000" dirty="0" smtClean="0"/>
-              <a:t>with </a:t>
-            </a:r>
-            <a:r>
-              <a:rPr lang="en-US" sz="3000" dirty="0" smtClean="0"/>
-              <a:t>Git and GitHub</a:t>
+              <a:t>with Git and GitHub</a:t>
             </a:r>
             <a:r>
               <a:rPr lang="en-US" sz="4800" dirty="0" smtClean="0"/>
@@ -4713,257 +4784,6 @@
             <p:ph type="title"/>
           </p:nvPr>
         </p:nvSpPr>
-        <p:spPr/>
-        <p:txBody>
-          <a:bodyPr>
-            <a:normAutofit/>
-          </a:bodyPr>
-          <a:lstStyle/>
-          <a:p>
-            <a:pPr algn="ctr"/>
-            <a:r>
-              <a:rPr lang="en-US" sz="4000" cap="none" dirty="0" smtClean="0"/>
-              <a:t>Why use </a:t>
-            </a:r>
-            <a:r>
-              <a:rPr lang="en-US" sz="4000" cap="none" dirty="0" err="1" smtClean="0"/>
-              <a:t>github</a:t>
-            </a:r>
-            <a:r>
-              <a:rPr lang="en-US" sz="4000" cap="none" dirty="0" smtClean="0"/>
-              <a:t> ?</a:t>
-            </a:r>
-            <a:endParaRPr lang="en-US" sz="4000" cap="none" dirty="0"/>
-          </a:p>
-        </p:txBody>
-      </p:sp>
-      <p:sp>
-        <p:nvSpPr>
-          <p:cNvPr id="3" name="Content Placeholder 2"/>
-          <p:cNvSpPr>
-            <a:spLocks noGrp="1"/>
-          </p:cNvSpPr>
-          <p:nvPr>
-            <p:ph idx="1"/>
-          </p:nvPr>
-        </p:nvSpPr>
-        <p:spPr/>
-        <p:txBody>
-          <a:bodyPr>
-            <a:normAutofit/>
-          </a:bodyPr>
-          <a:lstStyle/>
-          <a:p>
-            <a:pPr>
-              <a:buFont typeface="Wingdings" panose="05000000000000000000" pitchFamily="2" charset="2"/>
-              <a:buChar char="q"/>
-            </a:pPr>
-            <a:r>
-              <a:rPr lang="en-US" dirty="0" smtClean="0"/>
-              <a:t> </a:t>
-            </a:r>
-            <a:r>
-              <a:rPr lang="en-US" dirty="0" err="1" smtClean="0"/>
-              <a:t>Github</a:t>
-            </a:r>
-            <a:r>
-              <a:rPr lang="en-US" dirty="0" smtClean="0"/>
-              <a:t> takes </a:t>
-            </a:r>
-            <a:r>
-              <a:rPr lang="en-US" dirty="0"/>
-              <a:t>care of the server aspects of </a:t>
-            </a:r>
-            <a:r>
-              <a:rPr lang="en-US" dirty="0" err="1" smtClean="0"/>
-              <a:t>git</a:t>
-            </a:r>
-            <a:endParaRPr lang="en-US" dirty="0" smtClean="0"/>
-          </a:p>
-          <a:p>
-            <a:pPr>
-              <a:buFont typeface="Wingdings" panose="05000000000000000000" pitchFamily="2" charset="2"/>
-              <a:buChar char="q"/>
-            </a:pPr>
-            <a:endParaRPr lang="en-US" dirty="0"/>
-          </a:p>
-          <a:p>
-            <a:pPr>
-              <a:buFont typeface="Wingdings" panose="05000000000000000000" pitchFamily="2" charset="2"/>
-              <a:buChar char="q"/>
-            </a:pPr>
-            <a:r>
-              <a:rPr lang="en-US" dirty="0" smtClean="0"/>
-              <a:t>  </a:t>
-            </a:r>
-            <a:r>
-              <a:rPr lang="en-US" dirty="0"/>
-              <a:t>Graphical user interface for </a:t>
-            </a:r>
-            <a:r>
-              <a:rPr lang="en-US" dirty="0" err="1" smtClean="0"/>
-              <a:t>git</a:t>
-            </a:r>
-            <a:endParaRPr lang="en-US" dirty="0"/>
-          </a:p>
-          <a:p>
-            <a:pPr lvl="1">
-              <a:buFont typeface="Wingdings" panose="05000000000000000000" pitchFamily="2" charset="2"/>
-              <a:buChar char="Ø"/>
-            </a:pPr>
-            <a:r>
-              <a:rPr lang="en-US" dirty="0"/>
-              <a:t> </a:t>
-            </a:r>
-            <a:r>
-              <a:rPr lang="en-US" dirty="0" smtClean="0"/>
-              <a:t>Exploring </a:t>
-            </a:r>
-            <a:r>
-              <a:rPr lang="en-US" dirty="0"/>
-              <a:t>code and its </a:t>
-            </a:r>
-            <a:r>
-              <a:rPr lang="en-US" dirty="0" smtClean="0"/>
-              <a:t>history</a:t>
-            </a:r>
-          </a:p>
-          <a:p>
-            <a:pPr lvl="1">
-              <a:buFont typeface="Wingdings" panose="05000000000000000000" pitchFamily="2" charset="2"/>
-              <a:buChar char="Ø"/>
-            </a:pPr>
-            <a:r>
-              <a:rPr lang="en-US" dirty="0" smtClean="0"/>
-              <a:t>Tracking issues</a:t>
-            </a:r>
-          </a:p>
-          <a:p>
-            <a:pPr lvl="1">
-              <a:buFont typeface="Wingdings" panose="05000000000000000000" pitchFamily="2" charset="2"/>
-              <a:buChar char="Ø"/>
-            </a:pPr>
-            <a:endParaRPr lang="en-US" dirty="0"/>
-          </a:p>
-          <a:p>
-            <a:pPr>
-              <a:buFont typeface="Wingdings" panose="05000000000000000000" pitchFamily="2" charset="2"/>
-              <a:buChar char="q"/>
-            </a:pPr>
-            <a:r>
-              <a:rPr lang="en-US" dirty="0"/>
-              <a:t> </a:t>
-            </a:r>
-            <a:r>
-              <a:rPr lang="en-US" dirty="0" smtClean="0"/>
-              <a:t>Facilitates:</a:t>
-            </a:r>
-            <a:endParaRPr lang="en-US" dirty="0"/>
-          </a:p>
-          <a:p>
-            <a:pPr lvl="1">
-              <a:buFont typeface="Wingdings" panose="05000000000000000000" pitchFamily="2" charset="2"/>
-              <a:buChar char="Ø"/>
-            </a:pPr>
-            <a:r>
-              <a:rPr lang="en-US" dirty="0" smtClean="0"/>
-              <a:t> Learning </a:t>
-            </a:r>
-            <a:r>
-              <a:rPr lang="en-US" dirty="0"/>
-              <a:t>from </a:t>
-            </a:r>
-            <a:r>
-              <a:rPr lang="en-US" dirty="0" smtClean="0"/>
-              <a:t>others</a:t>
-            </a:r>
-          </a:p>
-          <a:p>
-            <a:pPr lvl="1">
-              <a:buFont typeface="Wingdings" panose="05000000000000000000" pitchFamily="2" charset="2"/>
-              <a:buChar char="Ø"/>
-            </a:pPr>
-            <a:r>
-              <a:rPr lang="en-US" dirty="0" smtClean="0"/>
-              <a:t>  Seeing </a:t>
-            </a:r>
-            <a:r>
-              <a:rPr lang="en-US" dirty="0"/>
-              <a:t>what people are up </a:t>
-            </a:r>
-            <a:r>
-              <a:rPr lang="en-US" dirty="0" smtClean="0"/>
-              <a:t>to</a:t>
-            </a:r>
-          </a:p>
-          <a:p>
-            <a:pPr lvl="1">
-              <a:buFont typeface="Wingdings" panose="05000000000000000000" pitchFamily="2" charset="2"/>
-              <a:buChar char="Ø"/>
-            </a:pPr>
-            <a:r>
-              <a:rPr lang="en-US" dirty="0" smtClean="0"/>
-              <a:t> Contributing </a:t>
-            </a:r>
-            <a:r>
-              <a:rPr lang="en-US" dirty="0"/>
-              <a:t>to others’ </a:t>
-            </a:r>
-            <a:r>
-              <a:rPr lang="en-US" dirty="0" smtClean="0"/>
-              <a:t>code </a:t>
-            </a:r>
-            <a:endParaRPr lang="en-US" dirty="0"/>
-          </a:p>
-        </p:txBody>
-      </p:sp>
-    </p:spTree>
-    <p:extLst>
-      <p:ext uri="{BB962C8B-B14F-4D97-AF65-F5344CB8AC3E}">
-        <p14:creationId xmlns:p14="http://schemas.microsoft.com/office/powerpoint/2010/main" val="4083448871"/>
-      </p:ext>
-    </p:extLst>
-  </p:cSld>
-  <p:clrMapOvr>
-    <a:masterClrMapping/>
-  </p:clrMapOvr>
-  <p:timing>
-    <p:tnLst>
-      <p:par>
-        <p:cTn id="1" dur="indefinite" restart="never" nodeType="tmRoot"/>
-      </p:par>
-    </p:tnLst>
-  </p:timing>
-</p:sld>
-</file>
-
-<file path=ppt/slides/slide11.xml><?xml version="1.0" encoding="utf-8"?>
-<p:sld xmlns:a="http://schemas.openxmlformats.org/drawingml/2006/main" xmlns:r="http://schemas.openxmlformats.org/officeDocument/2006/relationships" xmlns:p="http://schemas.openxmlformats.org/presentationml/2006/main">
-  <p:cSld>
-    <p:spTree>
-      <p:nvGrpSpPr>
-        <p:cNvPr id="1" name=""/>
-        <p:cNvGrpSpPr/>
-        <p:nvPr/>
-      </p:nvGrpSpPr>
-      <p:grpSpPr>
-        <a:xfrm>
-          <a:off x="0" y="0"/>
-          <a:ext cx="0" cy="0"/>
-          <a:chOff x="0" y="0"/>
-          <a:chExt cx="0" cy="0"/>
-        </a:xfrm>
-      </p:grpSpPr>
-      <p:sp>
-        <p:nvSpPr>
-          <p:cNvPr id="2" name="Title 1"/>
-          <p:cNvSpPr>
-            <a:spLocks noGrp="1"/>
-          </p:cNvSpPr>
-          <p:nvPr>
-            <p:ph type="title"/>
-          </p:nvPr>
-        </p:nvSpPr>
         <p:spPr>
           <a:xfrm>
             <a:off x="1069848" y="484632"/>
@@ -5147,7 +4967,7 @@
 </p:sld>
 </file>
 
-<file path=ppt/slides/slide12.xml><?xml version="1.0" encoding="utf-8"?>
+<file path=ppt/slides/slide11.xml><?xml version="1.0" encoding="utf-8"?>
 <p:sld xmlns:a="http://schemas.openxmlformats.org/drawingml/2006/main" xmlns:r="http://schemas.openxmlformats.org/officeDocument/2006/relationships" xmlns:p="http://schemas.openxmlformats.org/presentationml/2006/main">
   <p:cSld>
     <p:spTree>
@@ -5239,7 +5059,7 @@
 </p:sld>
 </file>
 
-<file path=ppt/slides/slide13.xml><?xml version="1.0" encoding="utf-8"?>
+<file path=ppt/slides/slide12.xml><?xml version="1.0" encoding="utf-8"?>
 <p:sld xmlns:a="http://schemas.openxmlformats.org/drawingml/2006/main" xmlns:r="http://schemas.openxmlformats.org/officeDocument/2006/relationships" xmlns:p="http://schemas.openxmlformats.org/presentationml/2006/main">
   <p:cSld>
     <p:spTree>
@@ -5330,7 +5150,7 @@
 </p:sld>
 </file>
 
-<file path=ppt/slides/slide14.xml><?xml version="1.0" encoding="utf-8"?>
+<file path=ppt/slides/slide13.xml><?xml version="1.0" encoding="utf-8"?>
 <p:sld xmlns:a="http://schemas.openxmlformats.org/drawingml/2006/main" xmlns:r="http://schemas.openxmlformats.org/officeDocument/2006/relationships" xmlns:p="http://schemas.openxmlformats.org/presentationml/2006/main">
   <p:cSld>
     <p:spTree>
@@ -5478,7 +5298,6 @@
               <a:rPr lang="en-US" dirty="0"/>
               <a:t>the “Create repository” button</a:t>
             </a:r>
-            <a:endParaRPr lang="en-US" dirty="0"/>
           </a:p>
         </p:txBody>
       </p:sp>
@@ -5502,7 +5321,7 @@
 </p:sld>
 </file>
 
-<file path=ppt/slides/slide15.xml><?xml version="1.0" encoding="utf-8"?>
+<file path=ppt/slides/slide14.xml><?xml version="1.0" encoding="utf-8"?>
 <p:sld xmlns:a="http://schemas.openxmlformats.org/drawingml/2006/main" xmlns:r="http://schemas.openxmlformats.org/officeDocument/2006/relationships" xmlns:p="http://schemas.openxmlformats.org/presentationml/2006/main">
   <p:cSld>
     <p:spTree>
@@ -5612,7 +5431,7 @@
 </p:sld>
 </file>
 
-<file path=ppt/slides/slide16.xml><?xml version="1.0" encoding="utf-8"?>
+<file path=ppt/slides/slide15.xml><?xml version="1.0" encoding="utf-8"?>
 <p:sld xmlns:a="http://schemas.openxmlformats.org/drawingml/2006/main" xmlns:r="http://schemas.openxmlformats.org/officeDocument/2006/relationships" xmlns:p="http://schemas.openxmlformats.org/presentationml/2006/main">
   <p:cSld>
     <p:spTree>
@@ -5704,6 +5523,76 @@
 </p:sld>
 </file>
 
+<file path=ppt/slides/slide16.xml><?xml version="1.0" encoding="utf-8"?>
+<p:sld xmlns:a="http://schemas.openxmlformats.org/drawingml/2006/main" xmlns:r="http://schemas.openxmlformats.org/officeDocument/2006/relationships" xmlns:p="http://schemas.openxmlformats.org/presentationml/2006/main">
+  <p:cSld>
+    <p:spTree>
+      <p:nvGrpSpPr>
+        <p:cNvPr id="1" name=""/>
+        <p:cNvGrpSpPr/>
+        <p:nvPr/>
+      </p:nvGrpSpPr>
+      <p:grpSpPr>
+        <a:xfrm>
+          <a:off x="0" y="0"/>
+          <a:ext cx="0" cy="0"/>
+          <a:chOff x="0" y="0"/>
+          <a:chExt cx="0" cy="0"/>
+        </a:xfrm>
+      </p:grpSpPr>
+      <p:sp>
+        <p:nvSpPr>
+          <p:cNvPr id="2" name="Title 1"/>
+          <p:cNvSpPr>
+            <a:spLocks noGrp="1"/>
+          </p:cNvSpPr>
+          <p:nvPr>
+            <p:ph type="title"/>
+          </p:nvPr>
+        </p:nvSpPr>
+        <p:spPr>
+          <a:xfrm>
+            <a:off x="1180685" y="2535104"/>
+            <a:ext cx="10058400" cy="1609344"/>
+          </a:xfrm>
+        </p:spPr>
+        <p:txBody>
+          <a:bodyPr/>
+          <a:lstStyle/>
+          <a:p>
+            <a:pPr algn="ctr"/>
+            <a:r>
+              <a:rPr lang="en-US" dirty="0" smtClean="0"/>
+              <a:t>Pushing your project on </a:t>
+            </a:r>
+            <a:r>
+              <a:rPr lang="en-US" dirty="0" err="1" smtClean="0"/>
+              <a:t>github</a:t>
+            </a:r>
+            <a:endParaRPr lang="en-US" dirty="0"/>
+          </a:p>
+        </p:txBody>
+      </p:sp>
+    </p:spTree>
+    <p:extLst>
+      <p:ext uri="{BB962C8B-B14F-4D97-AF65-F5344CB8AC3E}">
+        <p14:creationId xmlns:p14="http://schemas.microsoft.com/office/powerpoint/2010/main" val="2356081538"/>
+      </p:ext>
+    </p:extLst>
+  </p:cSld>
+  <p:clrMapOvr>
+    <a:masterClrMapping/>
+  </p:clrMapOvr>
+  <p:timing>
+    <p:tnLst>
+      <p:par>
+        <p:cTn id="1" dur="indefinite" restart="never" nodeType="tmRoot"/>
+      </p:par>
+    </p:tnLst>
+  </p:timing>
+</p:sld>
+</file>
+
 <file path=ppt/slides/slide17.xml><?xml version="1.0" encoding="utf-8"?>
 <p:sld xmlns:a="http://schemas.openxmlformats.org/drawingml/2006/main" xmlns:r="http://schemas.openxmlformats.org/officeDocument/2006/relationships" xmlns:p="http://schemas.openxmlformats.org/presentationml/2006/main">
   <p:cSld>
@@ -5721,43 +5610,305 @@
           <a:chExt cx="0" cy="0"/>
         </a:xfrm>
       </p:grpSpPr>
-      <p:sp>
-        <p:nvSpPr>
-          <p:cNvPr id="2" name="Title 1"/>
-          <p:cNvSpPr>
-            <a:spLocks noGrp="1"/>
-          </p:cNvSpPr>
-          <p:nvPr>
-            <p:ph type="title"/>
-          </p:nvPr>
-        </p:nvSpPr>
+      <p:pic>
+        <p:nvPicPr>
+          <p:cNvPr id="5" name="Content Placeholder 4"/>
+          <p:cNvPicPr>
+            <a:picLocks noGrp="1" noChangeAspect="1"/>
+          </p:cNvPicPr>
+          <p:nvPr>
+            <p:ph idx="1"/>
+          </p:nvPr>
+        </p:nvPicPr>
+        <p:blipFill>
+          <a:blip r:embed="rId2"/>
+          <a:stretch>
+            <a:fillRect/>
+          </a:stretch>
+        </p:blipFill>
         <p:spPr>
           <a:xfrm>
-            <a:off x="1180685" y="2535104"/>
-            <a:ext cx="10058400" cy="1609344"/>
+            <a:off x="838200" y="995402"/>
+            <a:ext cx="6711950" cy="4719597"/>
+          </a:xfrm>
+          <a:prstGeom prst="rect">
+            <a:avLst/>
+          </a:prstGeom>
+        </p:spPr>
+      </p:pic>
+      <p:sp>
+        <p:nvSpPr>
+          <p:cNvPr id="4" name="Text Placeholder 3"/>
+          <p:cNvSpPr>
+            <a:spLocks noGrp="1"/>
+          </p:cNvSpPr>
+          <p:nvPr>
+            <p:ph type="body" sz="half" idx="2"/>
+          </p:nvPr>
+        </p:nvSpPr>
+        <p:spPr>
+          <a:xfrm>
+            <a:off x="8243248" y="995402"/>
+            <a:ext cx="3780430" cy="4719598"/>
           </a:xfrm>
         </p:spPr>
         <p:txBody>
           <a:bodyPr/>
           <a:lstStyle/>
           <a:p>
-            <a:pPr algn="ctr"/>
-            <a:r>
-              <a:rPr lang="en-US" dirty="0" smtClean="0"/>
-              <a:t>Pushing your project on </a:t>
-            </a:r>
-            <a:r>
-              <a:rPr lang="en-US" dirty="0" err="1" smtClean="0"/>
-              <a:t>github</a:t>
-            </a:r>
-            <a:endParaRPr lang="en-US" dirty="0"/>
+            <a:pPr marL="285750" indent="-285750">
+              <a:buFont typeface="Wingdings" panose="05000000000000000000" pitchFamily="2" charset="2"/>
+              <a:buChar char="q"/>
+            </a:pPr>
+            <a:r>
+              <a:rPr lang="en-US" dirty="0" smtClean="0"/>
+              <a:t>Initialize </a:t>
+            </a:r>
+            <a:r>
+              <a:rPr lang="en-US" dirty="0"/>
+              <a:t>repository</a:t>
+            </a:r>
+            <a:r>
+              <a:rPr lang="en-US" dirty="0" smtClean="0"/>
+              <a:t> </a:t>
+            </a:r>
+          </a:p>
+          <a:p>
+            <a:pPr marL="685800" lvl="1" indent="-228600">
+              <a:buFont typeface="Wingdings" panose="05000000000000000000" pitchFamily="2" charset="2"/>
+              <a:buChar char="Ø"/>
+            </a:pPr>
+            <a:r>
+              <a:rPr lang="en-US" sz="1400" dirty="0"/>
+              <a:t>Create (and cd to) a working directory</a:t>
+            </a:r>
+          </a:p>
+          <a:p>
+            <a:pPr lvl="1"/>
+            <a:r>
+              <a:rPr lang="en-US" sz="1400" dirty="0"/>
+              <a:t>    </a:t>
+            </a:r>
+            <a:r>
+              <a:rPr lang="en-US" sz="1400" dirty="0" err="1"/>
+              <a:t>E.g</a:t>
+            </a:r>
+            <a:r>
+              <a:rPr lang="en-US" sz="1400" dirty="0"/>
+              <a:t>, ~/</a:t>
+            </a:r>
+            <a:r>
+              <a:rPr lang="en-US" sz="1400" dirty="0" err="1" smtClean="0"/>
+              <a:t>IndabaX</a:t>
+            </a:r>
+            <a:r>
+              <a:rPr lang="en-US" sz="1400" dirty="0" smtClean="0"/>
+              <a:t>/</a:t>
+            </a:r>
+            <a:r>
+              <a:rPr lang="en-US" sz="1400" dirty="0" err="1" smtClean="0"/>
+              <a:t>IndabaxTZ</a:t>
+            </a:r>
+            <a:endParaRPr lang="en-US" sz="1400" dirty="0"/>
+          </a:p>
+          <a:p>
+            <a:pPr marL="285750" indent="-285750">
+              <a:buFont typeface="Wingdings" panose="05000000000000000000" pitchFamily="2" charset="2"/>
+              <a:buChar char="q"/>
+            </a:pPr>
+            <a:r>
+              <a:rPr lang="en-US" dirty="0" smtClean="0"/>
+              <a:t> </a:t>
+            </a:r>
+            <a:r>
+              <a:rPr lang="en-US" dirty="0"/>
+              <a:t>Initialize it to be a </a:t>
+            </a:r>
+            <a:r>
+              <a:rPr lang="en-US" dirty="0" err="1"/>
+              <a:t>git</a:t>
+            </a:r>
+            <a:r>
+              <a:rPr lang="en-US" dirty="0"/>
+              <a:t> </a:t>
+            </a:r>
+            <a:r>
+              <a:rPr lang="en-US" dirty="0" smtClean="0"/>
+              <a:t>repository</a:t>
+            </a:r>
+          </a:p>
+          <a:p>
+            <a:pPr marL="742950" lvl="2" indent="-285750">
+              <a:lnSpc>
+                <a:spcPct val="100000"/>
+              </a:lnSpc>
+              <a:spcBef>
+                <a:spcPts val="1000"/>
+              </a:spcBef>
+              <a:spcAft>
+                <a:spcPts val="0"/>
+              </a:spcAft>
+              <a:buFont typeface="Wingdings" panose="05000000000000000000" pitchFamily="2" charset="2"/>
+              <a:buChar char="Ø"/>
+            </a:pPr>
+            <a:r>
+              <a:rPr lang="en-US" sz="1400" i="1" dirty="0" err="1"/>
+              <a:t>git</a:t>
+            </a:r>
+            <a:r>
+              <a:rPr lang="en-US" sz="1400" i="1" dirty="0"/>
+              <a:t> </a:t>
+            </a:r>
+            <a:r>
+              <a:rPr lang="en-US" sz="1400" i="1" dirty="0" err="1"/>
+              <a:t>init</a:t>
+            </a:r>
+            <a:r>
+              <a:rPr lang="en-US" sz="1400" i="1" dirty="0"/>
+              <a:t> </a:t>
+            </a:r>
+            <a:endParaRPr lang="en-US" sz="1400" i="1" dirty="0" smtClean="0"/>
+          </a:p>
+          <a:p>
+            <a:pPr marL="285750" indent="-285750">
+              <a:buFont typeface="Wingdings" panose="05000000000000000000" pitchFamily="2" charset="2"/>
+              <a:buChar char="q"/>
+            </a:pPr>
+            <a:r>
+              <a:rPr lang="en-US" dirty="0"/>
+              <a:t>Incorporate into </a:t>
+            </a:r>
+            <a:r>
+              <a:rPr lang="en-US" dirty="0" smtClean="0"/>
+              <a:t>repository</a:t>
+            </a:r>
+          </a:p>
+          <a:p>
+            <a:pPr marL="742950" lvl="2" indent="-285750">
+              <a:lnSpc>
+                <a:spcPct val="100000"/>
+              </a:lnSpc>
+              <a:spcBef>
+                <a:spcPts val="1000"/>
+              </a:spcBef>
+              <a:spcAft>
+                <a:spcPts val="0"/>
+              </a:spcAft>
+              <a:buFont typeface="Wingdings" panose="05000000000000000000" pitchFamily="2" charset="2"/>
+              <a:buChar char="Ø"/>
+            </a:pPr>
+            <a:r>
+              <a:rPr lang="en-US" sz="1200" dirty="0"/>
+              <a:t>Stage the changes using </a:t>
+            </a:r>
+            <a:r>
+              <a:rPr lang="en-US" sz="1200" i="1" dirty="0" err="1"/>
+              <a:t>git</a:t>
+            </a:r>
+            <a:r>
+              <a:rPr lang="en-US" sz="1200" i="1" dirty="0"/>
+              <a:t> </a:t>
+            </a:r>
+            <a:r>
+              <a:rPr lang="en-US" sz="1200" i="1" dirty="0" smtClean="0"/>
+              <a:t>add</a:t>
+            </a:r>
+            <a:endParaRPr lang="en-US" dirty="0" smtClean="0"/>
+          </a:p>
+          <a:p>
+            <a:pPr marL="285750" indent="-285750">
+              <a:buFont typeface="Wingdings" panose="05000000000000000000" pitchFamily="2" charset="2"/>
+              <a:buChar char="q"/>
+            </a:pPr>
+            <a:r>
+              <a:rPr lang="en-US" dirty="0"/>
+              <a:t>Now commit using </a:t>
+            </a:r>
+            <a:r>
+              <a:rPr lang="en-US" dirty="0" err="1"/>
+              <a:t>git</a:t>
+            </a:r>
+            <a:r>
+              <a:rPr lang="en-US" dirty="0"/>
+              <a:t> commit</a:t>
+            </a:r>
+            <a:r>
+              <a:rPr lang="en-US" dirty="0" smtClean="0"/>
+              <a:t> </a:t>
+            </a:r>
+          </a:p>
+          <a:p>
+            <a:pPr marL="742950" lvl="1" indent="-285750">
+              <a:buFont typeface="Wingdings" panose="05000000000000000000" pitchFamily="2" charset="2"/>
+              <a:buChar char="Ø"/>
+            </a:pPr>
+            <a:r>
+              <a:rPr lang="en-US" dirty="0"/>
+              <a:t>T</a:t>
+            </a:r>
+            <a:r>
+              <a:rPr lang="en-US" dirty="0" smtClean="0"/>
+              <a:t>he </a:t>
+            </a:r>
+            <a:r>
+              <a:rPr lang="en-US" dirty="0"/>
+              <a:t>-m argument allows one to enter a </a:t>
+            </a:r>
+            <a:r>
+              <a:rPr lang="en-US" dirty="0" smtClean="0"/>
+              <a:t>message</a:t>
+            </a:r>
+          </a:p>
+          <a:p>
+            <a:pPr marL="742950" lvl="1" indent="-285750">
+              <a:buFont typeface="Wingdings" panose="05000000000000000000" pitchFamily="2" charset="2"/>
+              <a:buChar char="Ø"/>
+            </a:pPr>
+            <a:r>
+              <a:rPr lang="en-US" dirty="0" smtClean="0"/>
+              <a:t>Use </a:t>
+            </a:r>
+            <a:r>
+              <a:rPr lang="en-US" dirty="0"/>
+              <a:t>a meaningful </a:t>
+            </a:r>
+            <a:r>
+              <a:rPr lang="en-US" dirty="0" smtClean="0"/>
+              <a:t>message</a:t>
+            </a:r>
+          </a:p>
+          <a:p>
+            <a:pPr marL="742950" lvl="1" indent="-285750">
+              <a:buFont typeface="Wingdings" panose="05000000000000000000" pitchFamily="2" charset="2"/>
+              <a:buChar char="Ø"/>
+            </a:pPr>
+            <a:r>
+              <a:rPr lang="en-US" dirty="0" smtClean="0"/>
+              <a:t>Message </a:t>
+            </a:r>
+            <a:r>
+              <a:rPr lang="en-US" dirty="0"/>
+              <a:t>can have multiple lines, but make 1st line an </a:t>
+            </a:r>
+            <a:r>
+              <a:rPr lang="en-US" dirty="0" smtClean="0"/>
+              <a:t>overview</a:t>
+            </a:r>
+          </a:p>
+          <a:p>
+            <a:pPr lvl="1"/>
+            <a:endParaRPr lang="en-US" sz="1400" dirty="0" smtClean="0"/>
+          </a:p>
+          <a:p>
+            <a:pPr lvl="1"/>
+            <a:endParaRPr lang="en-US" dirty="0" smtClean="0"/>
           </a:p>
         </p:txBody>
       </p:sp>
     </p:spTree>
     <p:extLst>
       <p:ext uri="{BB962C8B-B14F-4D97-AF65-F5344CB8AC3E}">
-        <p14:creationId xmlns:p14="http://schemas.microsoft.com/office/powerpoint/2010/main" val="2356081538"/>
+        <p14:creationId xmlns:p14="http://schemas.microsoft.com/office/powerpoint/2010/main" val="2093840681"/>
       </p:ext>
     </p:extLst>
   </p:cSld>
@@ -5809,8 +5960,8 @@
         </p:blipFill>
         <p:spPr>
           <a:xfrm>
-            <a:off x="838200" y="995402"/>
-            <a:ext cx="6711950" cy="4719597"/>
+            <a:off x="1080656" y="685800"/>
+            <a:ext cx="6594762" cy="5029200"/>
           </a:xfrm>
           <a:prstGeom prst="rect">
             <a:avLst/>
@@ -5829,8 +5980,8 @@
         </p:nvSpPr>
         <p:spPr>
           <a:xfrm>
-            <a:off x="8243248" y="995402"/>
-            <a:ext cx="3780430" cy="4719598"/>
+            <a:off x="8256896" y="685800"/>
+            <a:ext cx="3493144" cy="5029200"/>
           </a:xfrm>
         </p:spPr>
         <p:txBody>
@@ -5843,253 +5994,62 @@
             </a:pPr>
             <a:r>
               <a:rPr lang="en-US" dirty="0" smtClean="0"/>
-              <a:t>Initialize </a:t>
-            </a:r>
-            <a:r>
-              <a:rPr lang="en-US" dirty="0"/>
-              <a:t>repository</a:t>
-            </a:r>
-            <a:r>
-              <a:rPr lang="en-US" dirty="0" smtClean="0"/>
+              <a:t>Use </a:t>
+            </a:r>
+            <a:r>
+              <a:rPr lang="en-US" dirty="0" err="1" smtClean="0"/>
+              <a:t>git</a:t>
+            </a:r>
+            <a:r>
+              <a:rPr lang="en-US" dirty="0" smtClean="0"/>
+              <a:t> status to check if you’re missing anything.</a:t>
+            </a:r>
+          </a:p>
+          <a:p>
+            <a:pPr marL="285750" indent="-285750">
+              <a:buFont typeface="Wingdings" panose="05000000000000000000" pitchFamily="2" charset="2"/>
+              <a:buChar char="q"/>
+            </a:pPr>
+            <a:r>
+              <a:rPr lang="en-US" dirty="0" smtClean="0"/>
+              <a:t>Push to the branch that you’re working on.</a:t>
+            </a:r>
+          </a:p>
+          <a:p>
+            <a:pPr marL="285750" indent="-285750">
+              <a:buFont typeface="Wingdings" panose="05000000000000000000" pitchFamily="2" charset="2"/>
+              <a:buChar char="q"/>
+            </a:pPr>
+            <a:r>
+              <a:rPr lang="en-US" dirty="0"/>
+              <a:t>Set up .</a:t>
+            </a:r>
+            <a:r>
+              <a:rPr lang="en-US" dirty="0" err="1"/>
+              <a:t>gitignore</a:t>
+            </a:r>
+            <a:r>
+              <a:rPr lang="en-US" dirty="0"/>
               <a:t> </a:t>
             </a:r>
-          </a:p>
-          <a:p>
-            <a:pPr marL="685800" lvl="1" indent="-228600">
-              <a:buFont typeface="Wingdings" panose="05000000000000000000" pitchFamily="2" charset="2"/>
-              <a:buChar char="Ø"/>
-            </a:pPr>
-            <a:r>
-              <a:rPr lang="en-US" sz="1400" dirty="0"/>
-              <a:t>Create (and cd to) a working directory</a:t>
-            </a:r>
-          </a:p>
-          <a:p>
-            <a:pPr lvl="1"/>
-            <a:r>
-              <a:rPr lang="en-US" sz="1400" dirty="0"/>
-              <a:t>    </a:t>
-            </a:r>
-            <a:r>
-              <a:rPr lang="en-US" sz="1400" dirty="0" err="1"/>
-              <a:t>E.g</a:t>
-            </a:r>
-            <a:r>
-              <a:rPr lang="en-US" sz="1400" dirty="0"/>
-              <a:t>, ~/</a:t>
-            </a:r>
-            <a:r>
-              <a:rPr lang="en-US" sz="1400" dirty="0" err="1" smtClean="0"/>
-              <a:t>IndabaX</a:t>
-            </a:r>
-            <a:r>
-              <a:rPr lang="en-US" sz="1400" dirty="0" smtClean="0"/>
-              <a:t>/</a:t>
-            </a:r>
-            <a:r>
-              <a:rPr lang="en-US" sz="1400" dirty="0" err="1" smtClean="0"/>
-              <a:t>IndabaxTZ</a:t>
-            </a:r>
-            <a:endParaRPr lang="en-US" sz="1400" dirty="0"/>
+            <a:r>
+              <a:rPr lang="en-US" dirty="0" smtClean="0"/>
+              <a:t>file</a:t>
+            </a:r>
           </a:p>
           <a:p>
             <a:pPr marL="285750" indent="-285750">
               <a:buFont typeface="Wingdings" panose="05000000000000000000" pitchFamily="2" charset="2"/>
               <a:buChar char="q"/>
             </a:pPr>
-            <a:r>
-              <a:rPr lang="en-US" dirty="0" smtClean="0"/>
-              <a:t> </a:t>
-            </a:r>
-            <a:r>
-              <a:rPr lang="en-US" dirty="0"/>
-              <a:t>Initialize it to be a </a:t>
-            </a:r>
-            <a:r>
-              <a:rPr lang="en-US" dirty="0" err="1"/>
-              <a:t>git</a:t>
-            </a:r>
-            <a:r>
-              <a:rPr lang="en-US" dirty="0"/>
-              <a:t> </a:t>
-            </a:r>
-            <a:r>
-              <a:rPr lang="en-US" dirty="0" smtClean="0"/>
-              <a:t>repository</a:t>
-            </a:r>
-          </a:p>
-          <a:p>
-            <a:pPr marL="742950" lvl="2" indent="-285750">
-              <a:lnSpc>
-                <a:spcPct val="100000"/>
-              </a:lnSpc>
-              <a:spcBef>
-                <a:spcPts val="1000"/>
-              </a:spcBef>
-              <a:spcAft>
-                <a:spcPts val="0"/>
-              </a:spcAft>
-              <a:buFont typeface="Wingdings" panose="05000000000000000000" pitchFamily="2" charset="2"/>
-              <a:buChar char="Ø"/>
-            </a:pPr>
-            <a:r>
-              <a:rPr lang="en-US" sz="1400" i="1" dirty="0" err="1"/>
-              <a:t>git</a:t>
-            </a:r>
-            <a:r>
-              <a:rPr lang="en-US" sz="1400" i="1" dirty="0"/>
-              <a:t> </a:t>
-            </a:r>
-            <a:r>
-              <a:rPr lang="en-US" sz="1400" i="1" dirty="0" err="1"/>
-              <a:t>init</a:t>
-            </a:r>
-            <a:r>
-              <a:rPr lang="en-US" sz="1400" i="1" dirty="0"/>
-              <a:t> </a:t>
-            </a:r>
-            <a:endParaRPr lang="en-US" sz="1400" i="1" dirty="0" smtClean="0"/>
-          </a:p>
-          <a:p>
-            <a:pPr marL="285750" indent="-285750">
-              <a:buFont typeface="Wingdings" panose="05000000000000000000" pitchFamily="2" charset="2"/>
-              <a:buChar char="q"/>
-            </a:pPr>
-            <a:r>
-              <a:rPr lang="en-US" dirty="0"/>
-              <a:t>Incorporate into </a:t>
-            </a:r>
-            <a:r>
-              <a:rPr lang="en-US" dirty="0" smtClean="0"/>
-              <a:t>repository</a:t>
-            </a:r>
-          </a:p>
-          <a:p>
-            <a:pPr marL="742950" lvl="2" indent="-285750">
-              <a:lnSpc>
-                <a:spcPct val="100000"/>
-              </a:lnSpc>
-              <a:spcBef>
-                <a:spcPts val="1000"/>
-              </a:spcBef>
-              <a:spcAft>
-                <a:spcPts val="0"/>
-              </a:spcAft>
-              <a:buFont typeface="Wingdings" panose="05000000000000000000" pitchFamily="2" charset="2"/>
-              <a:buChar char="Ø"/>
-            </a:pPr>
-            <a:r>
-              <a:rPr lang="en-US" sz="1200" dirty="0"/>
-              <a:t>Stage the changes using </a:t>
-            </a:r>
-            <a:r>
-              <a:rPr lang="en-US" sz="1200" i="1" dirty="0" err="1"/>
-              <a:t>git</a:t>
-            </a:r>
-            <a:r>
-              <a:rPr lang="en-US" sz="1200" i="1" dirty="0"/>
-              <a:t> </a:t>
-            </a:r>
-            <a:r>
-              <a:rPr lang="en-US" sz="1200" i="1" dirty="0" smtClean="0"/>
-              <a:t>add</a:t>
-            </a:r>
-            <a:endParaRPr lang="en-US" dirty="0" smtClean="0"/>
-          </a:p>
-          <a:p>
-            <a:pPr marL="285750" indent="-285750">
-              <a:buFont typeface="Wingdings" panose="05000000000000000000" pitchFamily="2" charset="2"/>
-              <a:buChar char="q"/>
-            </a:pPr>
-            <a:r>
-              <a:rPr lang="en-US" dirty="0"/>
-              <a:t>Now commit using </a:t>
-            </a:r>
-            <a:r>
-              <a:rPr lang="en-US" dirty="0" err="1"/>
-              <a:t>git</a:t>
-            </a:r>
-            <a:r>
-              <a:rPr lang="en-US" dirty="0"/>
-              <a:t> commit</a:t>
-            </a:r>
-            <a:r>
-              <a:rPr lang="en-US" dirty="0" smtClean="0"/>
-              <a:t> </a:t>
-            </a:r>
-          </a:p>
-          <a:p>
-            <a:pPr marL="742950" lvl="1" indent="-285750">
-              <a:buFont typeface="Wingdings" panose="05000000000000000000" pitchFamily="2" charset="2"/>
-              <a:buChar char="Ø"/>
-            </a:pPr>
-            <a:r>
-              <a:rPr lang="en-US" dirty="0"/>
-              <a:t>T</a:t>
-            </a:r>
-            <a:r>
-              <a:rPr lang="en-US" dirty="0" smtClean="0"/>
-              <a:t>he </a:t>
-            </a:r>
-            <a:r>
-              <a:rPr lang="en-US" dirty="0"/>
-              <a:t>-m argument allows one to enter a </a:t>
-            </a:r>
-            <a:r>
-              <a:rPr lang="en-US" dirty="0" smtClean="0"/>
-              <a:t>message</a:t>
-            </a:r>
-          </a:p>
-          <a:p>
-            <a:pPr marL="742950" lvl="1" indent="-285750">
-              <a:buFont typeface="Wingdings" panose="05000000000000000000" pitchFamily="2" charset="2"/>
-              <a:buChar char="Ø"/>
-            </a:pPr>
-            <a:r>
-              <a:rPr lang="en-US" dirty="0" smtClean="0"/>
-              <a:t>Use </a:t>
-            </a:r>
-            <a:r>
-              <a:rPr lang="en-US" dirty="0"/>
-              <a:t>a meaningful </a:t>
-            </a:r>
-            <a:r>
-              <a:rPr lang="en-US" dirty="0" smtClean="0"/>
-              <a:t>message</a:t>
-            </a:r>
-          </a:p>
-          <a:p>
-            <a:pPr marL="742950" lvl="1" indent="-285750">
-              <a:buFont typeface="Wingdings" panose="05000000000000000000" pitchFamily="2" charset="2"/>
-              <a:buChar char="Ø"/>
-            </a:pPr>
-            <a:r>
-              <a:rPr lang="en-US" dirty="0" smtClean="0"/>
-              <a:t>Message </a:t>
-            </a:r>
-            <a:r>
-              <a:rPr lang="en-US" dirty="0"/>
-              <a:t>can have multiple lines, but make 1st line an </a:t>
-            </a:r>
-            <a:r>
-              <a:rPr lang="en-US" dirty="0" smtClean="0"/>
-              <a:t>overview</a:t>
-            </a:r>
-          </a:p>
-          <a:p>
-            <a:pPr lvl="1"/>
-            <a:endParaRPr lang="en-US" sz="1400" dirty="0" smtClean="0"/>
-          </a:p>
-          <a:p>
-            <a:pPr lvl="1"/>
-            <a:endParaRPr lang="en-US" dirty="0" smtClean="0"/>
+            <a:endParaRPr lang="en-US" dirty="0"/>
           </a:p>
         </p:txBody>
       </p:sp>
     </p:spTree>
     <p:extLst>
       <p:ext uri="{BB962C8B-B14F-4D97-AF65-F5344CB8AC3E}">
-        <p14:creationId xmlns:p14="http://schemas.microsoft.com/office/powerpoint/2010/main" val="2093840681"/>
+        <p14:creationId xmlns:p14="http://schemas.microsoft.com/office/powerpoint/2010/main" val="185670648"/>
       </p:ext>
     </p:extLst>
   </p:cSld>
@@ -6123,9 +6083,39 @@
           <a:chExt cx="0" cy="0"/>
         </a:xfrm>
       </p:grpSpPr>
+      <p:sp>
+        <p:nvSpPr>
+          <p:cNvPr id="2" name="Title 1"/>
+          <p:cNvSpPr>
+            <a:spLocks noGrp="1"/>
+          </p:cNvSpPr>
+          <p:nvPr>
+            <p:ph type="title"/>
+          </p:nvPr>
+        </p:nvSpPr>
+        <p:spPr/>
+        <p:txBody>
+          <a:bodyPr>
+            <a:normAutofit/>
+          </a:bodyPr>
+          <a:lstStyle/>
+          <a:p>
+            <a:pPr algn="ctr"/>
+            <a:r>
+              <a:rPr lang="en-US" sz="4000" cap="none" dirty="0" err="1" smtClean="0"/>
+              <a:t>Git</a:t>
+            </a:r>
+            <a:r>
+              <a:rPr lang="en-US" sz="4000" cap="none" dirty="0" smtClean="0"/>
+              <a:t> : STATUS</a:t>
+            </a:r>
+            <a:endParaRPr lang="en-US" sz="4000" cap="none" dirty="0"/>
+          </a:p>
+        </p:txBody>
+      </p:sp>
       <p:pic>
         <p:nvPicPr>
-          <p:cNvPr id="5" name="Content Placeholder 4"/>
+          <p:cNvPr id="4" name="Content Placeholder 3"/>
           <p:cNvPicPr>
             <a:picLocks noGrp="1" noChangeAspect="1"/>
           </p:cNvPicPr>
@@ -6141,96 +6131,18 @@
         </p:blipFill>
         <p:spPr>
           <a:xfrm>
-            <a:off x="1080656" y="685800"/>
-            <a:ext cx="6594762" cy="5029200"/>
+            <a:off x="1927225" y="2846387"/>
+            <a:ext cx="8343900" cy="2600325"/>
           </a:xfrm>
           <a:prstGeom prst="rect">
             <a:avLst/>
           </a:prstGeom>
         </p:spPr>
       </p:pic>
-      <p:sp>
-        <p:nvSpPr>
-          <p:cNvPr id="4" name="Text Placeholder 3"/>
-          <p:cNvSpPr>
-            <a:spLocks noGrp="1"/>
-          </p:cNvSpPr>
-          <p:nvPr>
-            <p:ph type="body" sz="half" idx="2"/>
-          </p:nvPr>
-        </p:nvSpPr>
-        <p:spPr>
-          <a:xfrm>
-            <a:off x="8256896" y="685800"/>
-            <a:ext cx="3493144" cy="5029200"/>
-          </a:xfrm>
-        </p:spPr>
-        <p:txBody>
-          <a:bodyPr/>
-          <a:lstStyle/>
-          <a:p>
-            <a:pPr marL="285750" indent="-285750">
-              <a:buFont typeface="Wingdings" panose="05000000000000000000" pitchFamily="2" charset="2"/>
-              <a:buChar char="q"/>
-            </a:pPr>
-            <a:r>
-              <a:rPr lang="en-US" dirty="0" smtClean="0"/>
-              <a:t>Use </a:t>
-            </a:r>
-            <a:r>
-              <a:rPr lang="en-US" dirty="0" err="1" smtClean="0"/>
-              <a:t>git</a:t>
-            </a:r>
-            <a:r>
-              <a:rPr lang="en-US" dirty="0" smtClean="0"/>
-              <a:t> status to check if you’re missing anything.</a:t>
-            </a:r>
-          </a:p>
-          <a:p>
-            <a:pPr marL="285750" indent="-285750">
-              <a:buFont typeface="Wingdings" panose="05000000000000000000" pitchFamily="2" charset="2"/>
-              <a:buChar char="q"/>
-            </a:pPr>
-            <a:r>
-              <a:rPr lang="en-US" dirty="0" smtClean="0"/>
-              <a:t>Push to the branch that you’re working on.</a:t>
-            </a:r>
-          </a:p>
-          <a:p>
-            <a:pPr marL="285750" indent="-285750">
-              <a:buFont typeface="Wingdings" panose="05000000000000000000" pitchFamily="2" charset="2"/>
-              <a:buChar char="q"/>
-            </a:pPr>
-            <a:r>
-              <a:rPr lang="en-US" dirty="0"/>
-              <a:t>Set up .</a:t>
-            </a:r>
-            <a:r>
-              <a:rPr lang="en-US" dirty="0" err="1"/>
-              <a:t>gitignore</a:t>
-            </a:r>
-            <a:r>
-              <a:rPr lang="en-US" dirty="0"/>
-              <a:t> </a:t>
-            </a:r>
-            <a:r>
-              <a:rPr lang="en-US" dirty="0" smtClean="0"/>
-              <a:t>file</a:t>
-            </a:r>
-          </a:p>
-          <a:p>
-            <a:pPr marL="285750" indent="-285750">
-              <a:buFont typeface="Wingdings" panose="05000000000000000000" pitchFamily="2" charset="2"/>
-              <a:buChar char="q"/>
-            </a:pPr>
-            <a:endParaRPr lang="en-US" dirty="0"/>
-          </a:p>
-        </p:txBody>
-      </p:sp>
     </p:spTree>
     <p:extLst>
       <p:ext uri="{BB962C8B-B14F-4D97-AF65-F5344CB8AC3E}">
-        <p14:creationId xmlns:p14="http://schemas.microsoft.com/office/powerpoint/2010/main" val="185670648"/>
+        <p14:creationId xmlns:p14="http://schemas.microsoft.com/office/powerpoint/2010/main" val="2931797153"/>
       </p:ext>
     </p:extLst>
   </p:cSld>
@@ -6274,7 +6186,12 @@
             <p:ph type="title"/>
           </p:nvPr>
         </p:nvSpPr>
-        <p:spPr/>
+        <p:spPr>
+          <a:xfrm>
+            <a:off x="1069848" y="484632"/>
+            <a:ext cx="10058400" cy="1636776"/>
+          </a:xfrm>
+        </p:spPr>
         <p:txBody>
           <a:bodyPr>
             <a:normAutofit/>
@@ -6309,12 +6226,20 @@
               <a:buNone/>
             </a:pPr>
             <a:r>
-              <a:rPr lang="en-US" dirty="0" smtClean="0"/>
+              <a:rPr lang="en-US" b="1" dirty="0" smtClean="0"/>
               <a:t>Version </a:t>
             </a:r>
             <a:r>
-              <a:rPr lang="en-US" dirty="0"/>
-              <a:t>control allows you to keep track of your work and helps you to easily explore the changes you have made, be it data, coding scripts, notes, </a:t>
+              <a:rPr lang="en-US" b="1" dirty="0"/>
+              <a:t>control </a:t>
+            </a:r>
+            <a:r>
+              <a:rPr lang="en-US" dirty="0"/>
+              <a:t>allows you to keep track of your work and helps you to easily explore the changes you have made, be it data, </a:t>
+            </a:r>
+            <a:r>
+              <a:rPr lang="en-US" dirty="0" smtClean="0"/>
+              <a:t>codes, notes </a:t>
             </a:r>
             <a:r>
               <a:rPr lang="en-US" dirty="0" smtClean="0"/>
@@ -6322,10 +6247,127 @@
             </a:r>
           </a:p>
           <a:p>
+            <a:pPr>
+              <a:buFont typeface="Wingdings" panose="05000000000000000000" pitchFamily="2" charset="2"/>
+              <a:buChar char="q"/>
+            </a:pPr>
+            <a:r>
+              <a:rPr lang="en-US" dirty="0" smtClean="0"/>
+              <a:t> Challenges </a:t>
+            </a:r>
+            <a:r>
+              <a:rPr lang="en-US" dirty="0"/>
+              <a:t>of working on a </a:t>
+            </a:r>
+            <a:r>
+              <a:rPr lang="en-US" dirty="0" smtClean="0"/>
+              <a:t>project</a:t>
+            </a:r>
+          </a:p>
+          <a:p>
+            <a:pPr lvl="1">
+              <a:buFont typeface="Wingdings" panose="05000000000000000000" pitchFamily="2" charset="2"/>
+              <a:buChar char="Ø"/>
+            </a:pPr>
+            <a:r>
+              <a:rPr lang="en-US" dirty="0"/>
+              <a:t> </a:t>
+            </a:r>
+            <a:r>
+              <a:rPr lang="en-US" dirty="0" smtClean="0"/>
+              <a:t>Undo </a:t>
+            </a:r>
+            <a:r>
+              <a:rPr lang="en-US" dirty="0"/>
+              <a:t>and </a:t>
+            </a:r>
+            <a:r>
+              <a:rPr lang="en-US" dirty="0" smtClean="0"/>
+              <a:t>Redo</a:t>
+            </a:r>
             <a:endParaRPr lang="en-US" dirty="0"/>
           </a:p>
-        </p:txBody>
-      </p:sp>
+          <a:p>
+            <a:pPr lvl="1">
+              <a:buFont typeface="Wingdings" panose="05000000000000000000" pitchFamily="2" charset="2"/>
+              <a:buChar char="Ø"/>
+            </a:pPr>
+            <a:r>
+              <a:rPr lang="en-US" dirty="0" smtClean="0"/>
+              <a:t>Tracking changes</a:t>
+            </a:r>
+          </a:p>
+          <a:p>
+            <a:pPr lvl="1">
+              <a:buFont typeface="Wingdings" panose="05000000000000000000" pitchFamily="2" charset="2"/>
+              <a:buChar char="Ø"/>
+            </a:pPr>
+            <a:r>
+              <a:rPr lang="en-US" dirty="0" smtClean="0"/>
+              <a:t>Working </a:t>
+            </a:r>
+            <a:r>
+              <a:rPr lang="en-US" dirty="0"/>
+              <a:t>with </a:t>
+            </a:r>
+            <a:r>
+              <a:rPr lang="en-US" dirty="0" smtClean="0"/>
+              <a:t>others</a:t>
+            </a:r>
+          </a:p>
+          <a:p>
+            <a:pPr lvl="1">
+              <a:buFont typeface="Wingdings" panose="05000000000000000000" pitchFamily="2" charset="2"/>
+              <a:buChar char="Ø"/>
+            </a:pPr>
+            <a:r>
+              <a:rPr lang="en-US" dirty="0" smtClean="0"/>
+              <a:t>Sharing Changes</a:t>
+            </a:r>
+          </a:p>
+          <a:p>
+            <a:pPr lvl="1">
+              <a:buFont typeface="Wingdings" panose="05000000000000000000" pitchFamily="2" charset="2"/>
+              <a:buChar char="Ø"/>
+            </a:pPr>
+            <a:r>
+              <a:rPr lang="en-US" dirty="0" smtClean="0"/>
+              <a:t>Overlapping </a:t>
+            </a:r>
+            <a:r>
+              <a:rPr lang="en-US" dirty="0"/>
+              <a:t>work when working in a team</a:t>
+            </a:r>
+          </a:p>
+          <a:p>
+            <a:endParaRPr lang="en-US" dirty="0"/>
+          </a:p>
+        </p:txBody>
+      </p:sp>
+      <p:pic>
+        <p:nvPicPr>
+          <p:cNvPr id="4" name="Picture 3"/>
+          <p:cNvPicPr>
+            <a:picLocks noChangeAspect="1"/>
+          </p:cNvPicPr>
+          <p:nvPr/>
+        </p:nvPicPr>
+        <p:blipFill>
+          <a:blip r:embed="rId3"/>
+          <a:stretch>
+            <a:fillRect/>
+          </a:stretch>
+        </p:blipFill>
+        <p:spPr>
+          <a:xfrm>
+            <a:off x="6099048" y="2837875"/>
+            <a:ext cx="5822185" cy="3700593"/>
+          </a:xfrm>
+          <a:prstGeom prst="rect">
+            <a:avLst/>
+          </a:prstGeom>
+        </p:spPr>
+      </p:pic>
     </p:spTree>
     <p:extLst>
       <p:ext uri="{BB962C8B-B14F-4D97-AF65-F5344CB8AC3E}">
@@ -6380,49 +6422,117 @@
           </a:bodyPr>
           <a:lstStyle/>
           <a:p>
-            <a:pPr algn="ctr"/>
-            <a:r>
-              <a:rPr lang="en-US" sz="4000" cap="none" dirty="0" err="1" smtClean="0"/>
-              <a:t>Git</a:t>
-            </a:r>
             <a:r>
               <a:rPr lang="en-US" sz="4000" cap="none" dirty="0" smtClean="0"/>
-              <a:t> : STATUS</a:t>
+              <a:t>Removing/moving files</a:t>
             </a:r>
             <a:endParaRPr lang="en-US" sz="4000" cap="none" dirty="0"/>
           </a:p>
         </p:txBody>
       </p:sp>
-      <p:pic>
-        <p:nvPicPr>
-          <p:cNvPr id="4" name="Content Placeholder 3"/>
-          <p:cNvPicPr>
-            <a:picLocks noGrp="1" noChangeAspect="1"/>
-          </p:cNvPicPr>
+      <p:sp>
+        <p:nvSpPr>
+          <p:cNvPr id="3" name="Content Placeholder 2"/>
+          <p:cNvSpPr>
+            <a:spLocks noGrp="1"/>
+          </p:cNvSpPr>
           <p:nvPr>
             <p:ph idx="1"/>
           </p:nvPr>
-        </p:nvPicPr>
-        <p:blipFill>
-          <a:blip r:embed="rId2"/>
-          <a:stretch>
-            <a:fillRect/>
-          </a:stretch>
-        </p:blipFill>
-        <p:spPr>
-          <a:xfrm>
-            <a:off x="1927225" y="2846387"/>
-            <a:ext cx="8343900" cy="2600325"/>
-          </a:xfrm>
-          <a:prstGeom prst="rect">
-            <a:avLst/>
-          </a:prstGeom>
-        </p:spPr>
-      </p:pic>
+        </p:nvSpPr>
+        <p:spPr/>
+        <p:txBody>
+          <a:bodyPr/>
+          <a:lstStyle/>
+          <a:p>
+            <a:pPr marL="0" indent="0">
+              <a:buNone/>
+            </a:pPr>
+            <a:r>
+              <a:rPr lang="en-US" dirty="0" smtClean="0"/>
+              <a:t>Use the following for all files that are tracked by </a:t>
+            </a:r>
+            <a:r>
+              <a:rPr lang="en-US" dirty="0" err="1" smtClean="0"/>
+              <a:t>git</a:t>
+            </a:r>
+            <a:r>
+              <a:rPr lang="en-US" dirty="0" smtClean="0"/>
+              <a:t>. </a:t>
+            </a:r>
+            <a:endParaRPr lang="en-US" dirty="0"/>
+          </a:p>
+          <a:p>
+            <a:pPr>
+              <a:buFont typeface="Wingdings" panose="05000000000000000000" pitchFamily="2" charset="2"/>
+              <a:buChar char="q"/>
+            </a:pPr>
+            <a:r>
+              <a:rPr lang="en-US" dirty="0" smtClean="0"/>
+              <a:t> Use </a:t>
+            </a:r>
+            <a:r>
+              <a:rPr lang="en-US" i="1" dirty="0" err="1"/>
+              <a:t>git</a:t>
+            </a:r>
+            <a:r>
+              <a:rPr lang="en-US" i="1" dirty="0"/>
+              <a:t> </a:t>
+            </a:r>
+            <a:r>
+              <a:rPr lang="en-US" i="1" dirty="0" err="1"/>
+              <a:t>rm</a:t>
+            </a:r>
+            <a:r>
+              <a:rPr lang="en-US" i="1" dirty="0"/>
+              <a:t> </a:t>
+            </a:r>
+            <a:r>
+              <a:rPr lang="en-US" dirty="0"/>
+              <a:t>instead of just </a:t>
+            </a:r>
+            <a:r>
+              <a:rPr lang="en-US" i="1" dirty="0" err="1" smtClean="0"/>
+              <a:t>rm</a:t>
+            </a:r>
+            <a:endParaRPr lang="en-US" i="1" dirty="0"/>
+          </a:p>
+          <a:p>
+            <a:pPr>
+              <a:buFont typeface="Wingdings" panose="05000000000000000000" pitchFamily="2" charset="2"/>
+              <a:buChar char="q"/>
+            </a:pPr>
+            <a:r>
+              <a:rPr lang="en-US" dirty="0"/>
+              <a:t> </a:t>
+            </a:r>
+            <a:r>
+              <a:rPr lang="en-US" dirty="0" smtClean="0"/>
+              <a:t>Use </a:t>
+            </a:r>
+            <a:r>
+              <a:rPr lang="en-US" i="1" dirty="0" err="1"/>
+              <a:t>git</a:t>
+            </a:r>
+            <a:r>
+              <a:rPr lang="en-US" i="1" dirty="0"/>
+              <a:t> mv </a:t>
+            </a:r>
+            <a:r>
+              <a:rPr lang="en-US" dirty="0"/>
+              <a:t>instead of just </a:t>
+            </a:r>
+            <a:r>
+              <a:rPr lang="en-US" i="1" dirty="0"/>
+              <a:t>mv</a:t>
+            </a:r>
+          </a:p>
+        </p:txBody>
+      </p:sp>
     </p:spTree>
     <p:extLst>
       <p:ext uri="{BB962C8B-B14F-4D97-AF65-F5344CB8AC3E}">
-        <p14:creationId xmlns:p14="http://schemas.microsoft.com/office/powerpoint/2010/main" val="2931797153"/>
+        <p14:creationId xmlns:p14="http://schemas.microsoft.com/office/powerpoint/2010/main" val="911882323"/>
       </p:ext>
     </p:extLst>
   </p:cSld>
@@ -6475,7 +6585,7 @@
           <a:p>
             <a:r>
               <a:rPr lang="en-US" sz="4000" cap="none" dirty="0" smtClean="0"/>
-              <a:t>Removing/moving files</a:t>
+              <a:t>Destroy it and start over</a:t>
             </a:r>
             <a:endParaRPr lang="en-US" sz="4000" cap="none" dirty="0"/>
           </a:p>
@@ -6493,25 +6603,154 @@
         </p:nvSpPr>
         <p:spPr/>
         <p:txBody>
-          <a:bodyPr/>
+          <a:bodyPr>
+            <a:normAutofit/>
+          </a:bodyPr>
           <a:lstStyle/>
           <a:p>
-            <a:pPr marL="0" indent="0">
-              <a:buNone/>
-            </a:pPr>
-            <a:r>
-              <a:rPr lang="en-US" dirty="0" smtClean="0"/>
-              <a:t>Use the following for all files that are tracked by </a:t>
-            </a:r>
-            <a:r>
-              <a:rPr lang="en-US" dirty="0" err="1" smtClean="0"/>
+            <a:pPr>
+              <a:buFont typeface="Wingdings" panose="05000000000000000000" pitchFamily="2" charset="2"/>
+              <a:buChar char="q"/>
+            </a:pPr>
+            <a:r>
+              <a:rPr lang="en-US" dirty="0" smtClean="0"/>
+              <a:t> Why?</a:t>
+            </a:r>
+          </a:p>
+          <a:p>
+            <a:pPr lvl="1">
+              <a:buFont typeface="Wingdings" panose="05000000000000000000" pitchFamily="2" charset="2"/>
+              <a:buChar char="Ø"/>
+            </a:pPr>
+            <a:r>
+              <a:rPr lang="en-US" dirty="0" smtClean="0"/>
+              <a:t>You </a:t>
+            </a:r>
+            <a:r>
+              <a:rPr lang="en-US" dirty="0"/>
+              <a:t>commit something you shouldn’t have (large and/or </a:t>
+            </a:r>
+            <a:r>
+              <a:rPr lang="en-US" dirty="0" smtClean="0"/>
+              <a:t>private)</a:t>
+            </a:r>
+          </a:p>
+          <a:p>
+            <a:pPr lvl="1">
+              <a:buFont typeface="Wingdings" panose="05000000000000000000" pitchFamily="2" charset="2"/>
+              <a:buChar char="Ø"/>
+            </a:pPr>
+            <a:r>
+              <a:rPr lang="en-US" dirty="0" smtClean="0"/>
+              <a:t>You </a:t>
+            </a:r>
+            <a:r>
+              <a:rPr lang="en-US" dirty="0"/>
+              <a:t>are embarrassed by your repository’s </a:t>
+            </a:r>
+            <a:r>
+              <a:rPr lang="en-US" dirty="0" smtClean="0"/>
+              <a:t>history</a:t>
+            </a:r>
+          </a:p>
+          <a:p>
+            <a:pPr lvl="1">
+              <a:buFont typeface="Wingdings" panose="05000000000000000000" pitchFamily="2" charset="2"/>
+              <a:buChar char="Ø"/>
+            </a:pPr>
+            <a:r>
+              <a:rPr lang="en-US" dirty="0" smtClean="0"/>
+              <a:t>You </a:t>
+            </a:r>
+            <a:r>
+              <a:rPr lang="en-US" dirty="0"/>
+              <a:t>can’t figure out the mess you’ve made</a:t>
+            </a:r>
+          </a:p>
+          <a:p>
+            <a:pPr>
+              <a:buFont typeface="Wingdings" panose="05000000000000000000" pitchFamily="2" charset="2"/>
+              <a:buChar char="q"/>
+            </a:pPr>
+            <a:r>
+              <a:rPr lang="en-US" dirty="0"/>
+              <a:t> </a:t>
+            </a:r>
+            <a:r>
+              <a:rPr lang="en-US" dirty="0" smtClean="0"/>
+              <a:t>Pick </a:t>
+            </a:r>
+            <a:r>
+              <a:rPr lang="en-US" dirty="0"/>
+              <a:t>the repository you like and destroy the other </a:t>
+            </a:r>
+            <a:r>
+              <a:rPr lang="en-US" dirty="0" smtClean="0"/>
+              <a:t>one</a:t>
+            </a:r>
+          </a:p>
+          <a:p>
+            <a:pPr lvl="1">
+              <a:buFont typeface="Wingdings" panose="05000000000000000000" pitchFamily="2" charset="2"/>
+              <a:buChar char="Ø"/>
+            </a:pPr>
+            <a:r>
+              <a:rPr lang="en-US" dirty="0" smtClean="0"/>
+              <a:t>For </a:t>
+            </a:r>
+            <a:r>
+              <a:rPr lang="en-US" dirty="0"/>
+              <a:t>example, get your local directory in the state you like and destroy </a:t>
+            </a:r>
+            <a:r>
+              <a:rPr lang="en-US" dirty="0" smtClean="0"/>
+              <a:t>everything else</a:t>
+            </a:r>
+            <a:endParaRPr lang="en-US" dirty="0"/>
+          </a:p>
+          <a:p>
+            <a:pPr>
+              <a:buFont typeface="Wingdings" panose="05000000000000000000" pitchFamily="2" charset="2"/>
+              <a:buChar char="q"/>
+            </a:pPr>
+            <a:r>
+              <a:rPr lang="en-US" dirty="0"/>
+              <a:t> </a:t>
+            </a:r>
+            <a:r>
+              <a:rPr lang="en-US" dirty="0" smtClean="0"/>
+              <a:t>Local repository</a:t>
+            </a:r>
+          </a:p>
+          <a:p>
+            <a:pPr lvl="1">
+              <a:buFont typeface="Wingdings" panose="05000000000000000000" pitchFamily="2" charset="2"/>
+              <a:buChar char="Ø"/>
+            </a:pPr>
+            <a:r>
+              <a:rPr lang="en-US" dirty="0" smtClean="0"/>
+              <a:t>If </a:t>
+            </a:r>
+            <a:r>
+              <a:rPr lang="en-US" dirty="0"/>
+              <a:t>you delete the .</a:t>
+            </a:r>
+            <a:r>
+              <a:rPr lang="en-US" dirty="0" err="1"/>
               <a:t>git</a:t>
             </a:r>
             <a:r>
-              <a:rPr lang="en-US" dirty="0" smtClean="0"/>
-              <a:t>. </a:t>
-            </a:r>
-            <a:endParaRPr lang="en-US" dirty="0"/>
+              <a:rPr lang="en-US" dirty="0"/>
+              <a:t> subdirectory, it’ll no longer be a </a:t>
+            </a:r>
+            <a:r>
+              <a:rPr lang="en-US" dirty="0" err="1"/>
+              <a:t>git</a:t>
+            </a:r>
+            <a:r>
+              <a:rPr lang="en-US" dirty="0"/>
+              <a:t> repository</a:t>
+            </a:r>
           </a:p>
           <a:p>
             <a:pPr>
@@ -6520,71 +6759,33 @@
             </a:pPr>
             <a:r>
               <a:rPr lang="en-US" dirty="0" smtClean="0"/>
-              <a:t> Use </a:t>
-            </a:r>
-            <a:r>
-              <a:rPr lang="en-US" i="1" dirty="0" err="1"/>
-              <a:t>git</a:t>
-            </a:r>
-            <a:r>
-              <a:rPr lang="en-US" i="1" dirty="0"/>
-              <a:t> </a:t>
-            </a:r>
-            <a:r>
-              <a:rPr lang="en-US" i="1" dirty="0" err="1"/>
-              <a:t>rm</a:t>
-            </a:r>
-            <a:r>
-              <a:rPr lang="en-US" i="1" dirty="0"/>
-              <a:t> </a:t>
-            </a:r>
-            <a:r>
-              <a:rPr lang="en-US" dirty="0"/>
-              <a:t>instead of just </a:t>
-            </a:r>
-            <a:r>
-              <a:rPr lang="en-US" i="1" dirty="0" err="1" smtClean="0"/>
-              <a:t>rm</a:t>
-            </a:r>
-            <a:endParaRPr lang="en-US" i="1" dirty="0"/>
-          </a:p>
-          <a:p>
-            <a:pPr>
-              <a:buFont typeface="Wingdings" panose="05000000000000000000" pitchFamily="2" charset="2"/>
-              <a:buChar char="q"/>
-            </a:pPr>
-            <a:r>
-              <a:rPr lang="en-US" dirty="0"/>
-              <a:t> </a:t>
-            </a:r>
-            <a:r>
-              <a:rPr lang="en-US" dirty="0" smtClean="0"/>
-              <a:t>Use </a:t>
-            </a:r>
-            <a:r>
-              <a:rPr lang="en-US" i="1" dirty="0" err="1"/>
-              <a:t>git</a:t>
-            </a:r>
-            <a:r>
-              <a:rPr lang="en-US" i="1" dirty="0"/>
-              <a:t> mv </a:t>
-            </a:r>
-            <a:r>
-              <a:rPr lang="en-US" dirty="0"/>
-              <a:t>instead of just </a:t>
-            </a:r>
-            <a:r>
-              <a:rPr lang="en-US" i="1" dirty="0"/>
-              <a:t>mv</a:t>
-            </a:r>
-            <a:endParaRPr lang="en-US" i="1" dirty="0"/>
+              <a:t>GitHub </a:t>
+            </a:r>
+            <a:r>
+              <a:rPr lang="en-US" dirty="0"/>
+              <a:t>repository</a:t>
+            </a:r>
+          </a:p>
+          <a:p>
+            <a:pPr lvl="1">
+              <a:buFont typeface="Wingdings" panose="05000000000000000000" pitchFamily="2" charset="2"/>
+              <a:buChar char="Ø"/>
+            </a:pPr>
+            <a:r>
+              <a:rPr lang="en-US" dirty="0" smtClean="0"/>
+              <a:t>Go </a:t>
+            </a:r>
+            <a:r>
+              <a:rPr lang="en-US" dirty="0"/>
+              <a:t>to the settings for the repository and head down to the Danger Zone</a:t>
+            </a:r>
           </a:p>
         </p:txBody>
       </p:sp>
     </p:spTree>
     <p:extLst>
       <p:ext uri="{BB962C8B-B14F-4D97-AF65-F5344CB8AC3E}">
-        <p14:creationId xmlns:p14="http://schemas.microsoft.com/office/powerpoint/2010/main" val="911882323"/>
+        <p14:creationId xmlns:p14="http://schemas.microsoft.com/office/powerpoint/2010/main" val="230617190"/>
       </p:ext>
     </p:extLst>
   </p:cSld>
@@ -6635,9 +6836,10 @@
           </a:bodyPr>
           <a:lstStyle/>
           <a:p>
+            <a:pPr algn="ctr"/>
             <a:r>
               <a:rPr lang="en-US" sz="4000" cap="none" dirty="0" smtClean="0"/>
-              <a:t>Destroy it and start over</a:t>
+              <a:t>Branching and Merging</a:t>
             </a:r>
             <a:endParaRPr lang="en-US" sz="4000" cap="none" dirty="0"/>
           </a:p>
@@ -6655,9 +6857,7 @@
         </p:nvSpPr>
         <p:spPr/>
         <p:txBody>
-          <a:bodyPr>
-            <a:normAutofit/>
-          </a:bodyPr>
+          <a:bodyPr/>
           <a:lstStyle/>
           <a:p>
             <a:pPr>
@@ -6665,8 +6865,20 @@
               <a:buChar char="q"/>
             </a:pPr>
             <a:r>
-              <a:rPr lang="en-US" dirty="0" smtClean="0"/>
-              <a:t> Why?</a:t>
+              <a:rPr lang="en-US" dirty="0"/>
+              <a:t> </a:t>
+            </a:r>
+            <a:r>
+              <a:rPr lang="en-US" dirty="0" smtClean="0"/>
+              <a:t>Use </a:t>
+            </a:r>
+            <a:r>
+              <a:rPr lang="en-US" dirty="0"/>
+              <a:t>branches to test out new features without breaking the </a:t>
+            </a:r>
+            <a:r>
+              <a:rPr lang="en-US" dirty="0" smtClean="0"/>
+              <a:t>working code.</a:t>
             </a:r>
           </a:p>
           <a:p>
@@ -6676,16 +6888,25 @@
             </a:pPr>
             <a:r>
               <a:rPr lang="en-US" dirty="0" smtClean="0"/>
-              <a:t>You </a:t>
-            </a:r>
-            <a:r>
-              <a:rPr lang="en-US" dirty="0"/>
-              <a:t>commit something you shouldn’t have (large and/or </a:t>
-            </a:r>
-            <a:r>
-              <a:rPr lang="en-US" dirty="0" smtClean="0"/>
-              <a:t>private)</a:t>
-            </a:r>
+              <a:t> </a:t>
+            </a:r>
+            <a:r>
+              <a:rPr lang="en-US" dirty="0" err="1" smtClean="0"/>
+              <a:t>git</a:t>
+            </a:r>
+            <a:r>
+              <a:rPr lang="en-US" dirty="0" smtClean="0"/>
+              <a:t> </a:t>
+            </a:r>
+            <a:r>
+              <a:rPr lang="en-US" dirty="0"/>
+              <a:t>branch </a:t>
+            </a:r>
+            <a:r>
+              <a:rPr lang="en-US" dirty="0" smtClean="0"/>
+              <a:t>develop</a:t>
+            </a:r>
+            <a:endParaRPr lang="en-US" dirty="0"/>
           </a:p>
           <a:p>
             <a:pPr lvl="1">
@@ -6693,17 +6914,18 @@
               <a:buChar char="Ø"/>
             </a:pPr>
             <a:r>
-              <a:rPr lang="en-US" dirty="0" smtClean="0"/>
-              <a:t>You </a:t>
-            </a:r>
-            <a:r>
-              <a:rPr lang="en-US" dirty="0"/>
-              <a:t>are embarrassed by your repository’s </a:t>
-            </a:r>
-            <a:r>
-              <a:rPr lang="en-US" dirty="0" smtClean="0"/>
-              <a:t>history</a:t>
-            </a:r>
+              <a:rPr lang="en-US" dirty="0"/>
+              <a:t> </a:t>
+            </a:r>
+            <a:r>
+              <a:rPr lang="en-US" dirty="0" err="1" smtClean="0"/>
+              <a:t>git</a:t>
+            </a:r>
+            <a:r>
+              <a:rPr lang="en-US" dirty="0" smtClean="0"/>
+              <a:t> branch</a:t>
+            </a:r>
+            <a:endParaRPr lang="en-US" dirty="0"/>
           </a:p>
           <a:p>
             <a:pPr lvl="1">
@@ -6712,11 +6934,19 @@
             </a:pPr>
             <a:r>
               <a:rPr lang="en-US" dirty="0" smtClean="0"/>
-              <a:t>You </a:t>
-            </a:r>
-            <a:r>
-              <a:rPr lang="en-US" dirty="0"/>
-              <a:t>can’t figure out the mess you’ve made</a:t>
+              <a:t> </a:t>
+            </a:r>
+            <a:r>
+              <a:rPr lang="en-US" dirty="0" err="1" smtClean="0"/>
+              <a:t>git</a:t>
+            </a:r>
+            <a:r>
+              <a:rPr lang="en-US" dirty="0" smtClean="0"/>
+              <a:t> </a:t>
+            </a:r>
+            <a:r>
+              <a:rPr lang="en-US" dirty="0"/>
+              <a:t>checkout develop</a:t>
             </a:r>
           </a:p>
           <a:p>
@@ -6730,15 +6960,15 @@
             </a:r>
             <a:r>
               <a:rPr lang="en-US" dirty="0" smtClean="0"/>
-              <a:t>Pick </a:t>
-            </a:r>
-            <a:r>
-              <a:rPr lang="en-US" dirty="0"/>
-              <a:t>the repository you like and destroy the other </a:t>
-            </a:r>
-            <a:r>
-              <a:rPr lang="en-US" dirty="0" smtClean="0"/>
-              <a:t>one</a:t>
+              <a:t>When </a:t>
+            </a:r>
+            <a:r>
+              <a:rPr lang="en-US" dirty="0"/>
+              <a:t>you’re happy with the work, merge it back into your </a:t>
+            </a:r>
+            <a:r>
+              <a:rPr lang="en-US" dirty="0" smtClean="0"/>
+              <a:t>master branch.</a:t>
             </a:r>
           </a:p>
           <a:p>
@@ -6748,30 +6978,23 @@
             </a:pPr>
             <a:r>
               <a:rPr lang="en-US" dirty="0" smtClean="0"/>
-              <a:t>For </a:t>
-            </a:r>
-            <a:r>
-              <a:rPr lang="en-US" dirty="0"/>
-              <a:t>example, get your local directory in the state you like and destroy </a:t>
-            </a:r>
-            <a:r>
-              <a:rPr lang="en-US" dirty="0" smtClean="0"/>
-              <a:t>everything else</a:t>
-            </a:r>
-            <a:endParaRPr lang="en-US" dirty="0"/>
-          </a:p>
-          <a:p>
-            <a:pPr>
-              <a:buFont typeface="Wingdings" panose="05000000000000000000" pitchFamily="2" charset="2"/>
-              <a:buChar char="q"/>
-            </a:pPr>
-            <a:r>
-              <a:rPr lang="en-US" dirty="0"/>
               <a:t> </a:t>
             </a:r>
             <a:r>
-              <a:rPr lang="en-US" dirty="0" smtClean="0"/>
-              <a:t>Local repository</a:t>
+              <a:rPr lang="en-US" dirty="0" err="1" smtClean="0"/>
+              <a:t>git</a:t>
+            </a:r>
+            <a:r>
+              <a:rPr lang="en-US" dirty="0" smtClean="0"/>
+              <a:t> </a:t>
+            </a:r>
+            <a:r>
+              <a:rPr lang="en-US" dirty="0"/>
+              <a:t>checkout </a:t>
+            </a:r>
+            <a:r>
+              <a:rPr lang="en-US" dirty="0" smtClean="0"/>
+              <a:t>master</a:t>
             </a:r>
           </a:p>
           <a:p>
@@ -6780,56 +7003,24 @@
               <a:buChar char="Ø"/>
             </a:pPr>
             <a:r>
-              <a:rPr lang="en-US" dirty="0" smtClean="0"/>
-              <a:t>If </a:t>
-            </a:r>
-            <a:r>
-              <a:rPr lang="en-US" dirty="0"/>
-              <a:t>you delete the .</a:t>
-            </a:r>
-            <a:r>
-              <a:rPr lang="en-US" dirty="0" err="1"/>
+              <a:rPr lang="en-US" dirty="0"/>
+              <a:t> </a:t>
+            </a:r>
+            <a:r>
+              <a:rPr lang="en-US" dirty="0" err="1" smtClean="0"/>
               <a:t>git</a:t>
             </a:r>
             <a:r>
-              <a:rPr lang="en-US" dirty="0"/>
-              <a:t> subdirectory, it’ll no longer be a </a:t>
-            </a:r>
-            <a:r>
-              <a:rPr lang="en-US" dirty="0" err="1"/>
-              <a:t>git</a:t>
-            </a:r>
-            <a:r>
-              <a:rPr lang="en-US" dirty="0"/>
-              <a:t> repository</a:t>
-            </a:r>
-          </a:p>
-          <a:p>
-            <a:pPr>
-              <a:buFont typeface="Wingdings" panose="05000000000000000000" pitchFamily="2" charset="2"/>
-              <a:buChar char="q"/>
-            </a:pPr>
-            <a:r>
-              <a:rPr lang="en-US" dirty="0" smtClean="0"/>
-              <a:t>GitHub </a:t>
-            </a:r>
-            <a:r>
-              <a:rPr lang="en-US" dirty="0"/>
-              <a:t>repository</a:t>
-            </a:r>
-          </a:p>
-          <a:p>
-            <a:pPr lvl="1">
-              <a:buFont typeface="Wingdings" panose="05000000000000000000" pitchFamily="2" charset="2"/>
-              <a:buChar char="Ø"/>
-            </a:pPr>
-            <a:r>
-              <a:rPr lang="en-US" dirty="0" smtClean="0"/>
-              <a:t>Go </a:t>
-            </a:r>
-            <a:r>
-              <a:rPr lang="en-US" dirty="0"/>
-              <a:t>to the settings for the repository and head down to the Danger Zone</a:t>
+              <a:rPr lang="en-US" dirty="0" smtClean="0"/>
+              <a:t> </a:t>
+            </a:r>
+            <a:r>
+              <a:rPr lang="en-US" dirty="0"/>
+              <a:t>merge </a:t>
+            </a:r>
+            <a:r>
+              <a:rPr lang="en-US" dirty="0" smtClean="0"/>
+              <a:t>develop</a:t>
             </a:r>
             <a:endParaRPr lang="en-US" dirty="0"/>
           </a:p>
@@ -6838,7 +7029,7 @@
     </p:spTree>
     <p:extLst>
       <p:ext uri="{BB962C8B-B14F-4D97-AF65-F5344CB8AC3E}">
-        <p14:creationId xmlns:p14="http://schemas.microsoft.com/office/powerpoint/2010/main" val="230617190"/>
+        <p14:creationId xmlns:p14="http://schemas.microsoft.com/office/powerpoint/2010/main" val="51610636"/>
       </p:ext>
     </p:extLst>
   </p:cSld>
@@ -6882,17 +7073,21 @@
             <p:ph type="title"/>
           </p:nvPr>
         </p:nvSpPr>
-        <p:spPr/>
+        <p:spPr>
+          <a:xfrm>
+            <a:off x="1069848" y="484632"/>
+            <a:ext cx="10058400" cy="1344168"/>
+          </a:xfrm>
+        </p:spPr>
         <p:txBody>
           <a:bodyPr>
             <a:normAutofit/>
           </a:bodyPr>
           <a:lstStyle/>
           <a:p>
-            <a:pPr algn="ctr"/>
             <a:r>
               <a:rPr lang="en-US" sz="4000" cap="none" dirty="0" smtClean="0"/>
-              <a:t>Branching and Merging</a:t>
+              <a:t>Issues and Pull requests</a:t>
             </a:r>
             <a:endParaRPr lang="en-US" sz="4000" cap="none" dirty="0"/>
           </a:p>
@@ -6923,15 +7118,66 @@
             </a:r>
             <a:r>
               <a:rPr lang="en-US" dirty="0" smtClean="0"/>
-              <a:t>Use </a:t>
-            </a:r>
-            <a:r>
-              <a:rPr lang="en-US" dirty="0"/>
-              <a:t>branches to test out new features without breaking the </a:t>
-            </a:r>
-            <a:r>
-              <a:rPr lang="en-US" dirty="0" smtClean="0"/>
-              <a:t>working code.</a:t>
+              <a:t>Problem </a:t>
+            </a:r>
+            <a:r>
+              <a:rPr lang="en-US" dirty="0"/>
+              <a:t>with or suggestion for someone’s code</a:t>
+            </a:r>
+            <a:r>
+              <a:rPr lang="en-US" dirty="0" smtClean="0"/>
+              <a:t>?</a:t>
+            </a:r>
+          </a:p>
+          <a:p>
+            <a:pPr marL="560070" lvl="2" indent="-285750">
+              <a:spcBef>
+                <a:spcPts val="1200"/>
+              </a:spcBef>
+              <a:spcAft>
+                <a:spcPts val="0"/>
+              </a:spcAft>
+              <a:buFont typeface="Wingdings" panose="05000000000000000000" pitchFamily="2" charset="2"/>
+              <a:buChar char="Ø"/>
+            </a:pPr>
+            <a:r>
+              <a:rPr lang="en-US" dirty="0"/>
+              <a:t>Point it out as an </a:t>
+            </a:r>
+            <a:r>
+              <a:rPr lang="en-US" dirty="0" smtClean="0"/>
+              <a:t>Issue</a:t>
+            </a:r>
+          </a:p>
+          <a:p>
+            <a:pPr marL="560070" lvl="2" indent="-285750">
+              <a:spcBef>
+                <a:spcPts val="1200"/>
+              </a:spcBef>
+              <a:spcAft>
+                <a:spcPts val="0"/>
+              </a:spcAft>
+              <a:buFont typeface="Wingdings" panose="05000000000000000000" pitchFamily="2" charset="2"/>
+              <a:buChar char="Ø"/>
+            </a:pPr>
+            <a:endParaRPr lang="en-US" dirty="0" smtClean="0"/>
+          </a:p>
+          <a:p>
+            <a:pPr>
+              <a:buFont typeface="Wingdings" panose="05000000000000000000" pitchFamily="2" charset="2"/>
+              <a:buChar char="q"/>
+            </a:pPr>
+            <a:r>
+              <a:rPr lang="en-US" dirty="0" smtClean="0"/>
+              <a:t> Provide </a:t>
+            </a:r>
+            <a:r>
+              <a:rPr lang="en-US" dirty="0"/>
+              <a:t>a </a:t>
+            </a:r>
+            <a:r>
+              <a:rPr lang="en-US" dirty="0" smtClean="0"/>
+              <a:t>fix or better solution or suggesting a change to an existing repo</a:t>
             </a:r>
           </a:p>
           <a:p>
@@ -6941,7 +7187,34 @@
             </a:pPr>
             <a:r>
               <a:rPr lang="en-US" dirty="0" smtClean="0"/>
-              <a:t> </a:t>
+              <a:t>Fork </a:t>
+            </a:r>
+            <a:r>
+              <a:rPr lang="en-US" dirty="0"/>
+              <a:t>the </a:t>
+            </a:r>
+            <a:r>
+              <a:rPr lang="en-US" dirty="0" smtClean="0"/>
+              <a:t>repository</a:t>
+            </a:r>
+            <a:endParaRPr lang="en-US" dirty="0"/>
+          </a:p>
+          <a:p>
+            <a:pPr lvl="1">
+              <a:buFont typeface="Wingdings" panose="05000000000000000000" pitchFamily="2" charset="2"/>
+              <a:buChar char="Ø"/>
+            </a:pPr>
+            <a:r>
+              <a:rPr lang="en-US" dirty="0" smtClean="0"/>
+              <a:t> Clone </a:t>
+            </a:r>
+            <a:r>
+              <a:rPr lang="en-US" dirty="0"/>
+              <a:t>your version of </a:t>
+            </a:r>
+            <a:r>
+              <a:rPr lang="en-US" dirty="0" smtClean="0"/>
+              <a:t>it – </a:t>
             </a:r>
             <a:r>
               <a:rPr lang="en-US" dirty="0" err="1" smtClean="0"/>
@@ -6953,13 +7226,9 @@
             </a:r>
             <a:r>
               <a:rPr lang="en-US" dirty="0"/>
-              <a:t>branch </a:t>
-            </a:r>
-            <a:r>
-              <a:rPr lang="en-US" dirty="0" smtClean="0"/>
-              <a:t>develop</a:t>
-            </a:r>
-            <a:endParaRPr lang="en-US" dirty="0"/>
+              <a:t>clone https://github.com/InnocentSuta/IndabaxTZ</a:t>
+            </a:r>
+            <a:endParaRPr lang="en-US" dirty="0" smtClean="0"/>
           </a:p>
           <a:p>
             <a:pPr lvl="1">
@@ -6967,8 +7236,30 @@
               <a:buChar char="Ø"/>
             </a:pPr>
             <a:r>
+              <a:rPr lang="en-US" dirty="0" smtClean="0"/>
+              <a:t>Modify / change things locally - </a:t>
+            </a:r>
+            <a:r>
+              <a:rPr lang="en-US" dirty="0" err="1"/>
+              <a:t>git</a:t>
+            </a:r>
+            <a:r>
               <a:rPr lang="en-US" dirty="0"/>
               <a:t> </a:t>
+            </a:r>
+            <a:r>
+              <a:rPr lang="en-US" dirty="0" smtClean="0"/>
+              <a:t>add</a:t>
+            </a:r>
+          </a:p>
+          <a:p>
+            <a:pPr lvl="1">
+              <a:buFont typeface="Wingdings" panose="05000000000000000000" pitchFamily="2" charset="2"/>
+              <a:buChar char="Ø"/>
+            </a:pPr>
+            <a:r>
+              <a:rPr lang="en-US" dirty="0" smtClean="0"/>
+              <a:t>Commit changes – </a:t>
             </a:r>
             <a:r>
               <a:rPr lang="en-US" dirty="0" err="1" smtClean="0"/>
@@ -6976,9 +7267,8 @@
             </a:r>
             <a:r>
               <a:rPr lang="en-US" dirty="0" smtClean="0"/>
-              <a:t> branch</a:t>
-            </a:r>
-            <a:endParaRPr lang="en-US" dirty="0"/>
+              <a:t> commit</a:t>
+            </a:r>
           </a:p>
           <a:p>
             <a:pPr lvl="1">
@@ -6987,7 +7277,7 @@
             </a:pPr>
             <a:r>
               <a:rPr lang="en-US" dirty="0" smtClean="0"/>
-              <a:t> </a:t>
+              <a:t>Push to your repository  - </a:t>
             </a:r>
             <a:r>
               <a:rPr lang="en-US" dirty="0" err="1" smtClean="0"/>
@@ -6995,38 +7285,7 @@
             </a:r>
             <a:r>
               <a:rPr lang="en-US" dirty="0" smtClean="0"/>
-              <a:t> </a:t>
-            </a:r>
-            <a:r>
-              <a:rPr lang="en-US" dirty="0"/>
-              <a:t>checkout </a:t>
-            </a:r>
-            <a:r>
-              <a:rPr lang="en-US" dirty="0"/>
-              <a:t>develop</a:t>
-            </a:r>
-            <a:endParaRPr lang="en-US" dirty="0"/>
-          </a:p>
-          <a:p>
-            <a:pPr>
-              <a:buFont typeface="Wingdings" panose="05000000000000000000" pitchFamily="2" charset="2"/>
-              <a:buChar char="q"/>
-            </a:pPr>
-            <a:r>
-              <a:rPr lang="en-US" dirty="0"/>
-              <a:t> </a:t>
-            </a:r>
-            <a:r>
-              <a:rPr lang="en-US" dirty="0" smtClean="0"/>
-              <a:t>When </a:t>
-            </a:r>
-            <a:r>
-              <a:rPr lang="en-US" dirty="0"/>
-              <a:t>you’re happy with the work, merge it back into your </a:t>
-            </a:r>
-            <a:r>
-              <a:rPr lang="en-US" dirty="0" smtClean="0"/>
-              <a:t>master branch.</a:t>
+              <a:t> push</a:t>
             </a:r>
           </a:p>
           <a:p>
@@ -7036,49 +7295,15 @@
             </a:pPr>
             <a:r>
               <a:rPr lang="en-US" dirty="0" smtClean="0"/>
-              <a:t> </a:t>
-            </a:r>
-            <a:r>
-              <a:rPr lang="en-US" dirty="0" err="1" smtClean="0"/>
-              <a:t>git</a:t>
-            </a:r>
-            <a:r>
-              <a:rPr lang="en-US" dirty="0" smtClean="0"/>
-              <a:t> </a:t>
-            </a:r>
-            <a:r>
-              <a:rPr lang="en-US" dirty="0"/>
-              <a:t>checkout </a:t>
-            </a:r>
-            <a:r>
-              <a:rPr lang="en-US" dirty="0" smtClean="0"/>
-              <a:t>master</a:t>
-            </a:r>
-          </a:p>
-          <a:p>
-            <a:pPr lvl="1">
-              <a:buFont typeface="Wingdings" panose="05000000000000000000" pitchFamily="2" charset="2"/>
-              <a:buChar char="Ø"/>
-            </a:pPr>
-            <a:r>
-              <a:rPr lang="en-US" dirty="0"/>
-              <a:t> </a:t>
-            </a:r>
-            <a:r>
-              <a:rPr lang="en-US" dirty="0" err="1" smtClean="0"/>
-              <a:t>git</a:t>
-            </a:r>
-            <a:r>
-              <a:rPr lang="en-US" dirty="0" smtClean="0"/>
-              <a:t> </a:t>
-            </a:r>
-            <a:r>
-              <a:rPr lang="en-US" dirty="0"/>
-              <a:t>merge </a:t>
-            </a:r>
-            <a:r>
-              <a:rPr lang="en-US" dirty="0" smtClean="0"/>
-              <a:t>develop</a:t>
+              <a:t>Submit a Pull Request - </a:t>
+            </a:r>
+            <a:r>
+              <a:rPr lang="en-US" dirty="0"/>
+              <a:t>“Pull Requests” and “New pull request</a:t>
+            </a:r>
+            <a:r>
+              <a:rPr lang="en-US" dirty="0" smtClean="0"/>
+              <a:t>”</a:t>
             </a:r>
             <a:endParaRPr lang="en-US" dirty="0"/>
           </a:p>
@@ -7087,7 +7312,7 @@
     </p:spTree>
     <p:extLst>
       <p:ext uri="{BB962C8B-B14F-4D97-AF65-F5344CB8AC3E}">
-        <p14:creationId xmlns:p14="http://schemas.microsoft.com/office/powerpoint/2010/main" val="51610636"/>
+        <p14:creationId xmlns:p14="http://schemas.microsoft.com/office/powerpoint/2010/main" val="673486164"/>
       </p:ext>
     </p:extLst>
   </p:cSld>
@@ -7133,289 +7358,6 @@
         </p:nvSpPr>
         <p:spPr>
           <a:xfrm>
-            <a:off x="1069848" y="484632"/>
-            <a:ext cx="10058400" cy="1344168"/>
-          </a:xfrm>
-        </p:spPr>
-        <p:txBody>
-          <a:bodyPr>
-            <a:normAutofit/>
-          </a:bodyPr>
-          <a:lstStyle/>
-          <a:p>
-            <a:r>
-              <a:rPr lang="en-US" sz="4000" cap="none" dirty="0" smtClean="0"/>
-              <a:t>Issues and Pull requests</a:t>
-            </a:r>
-            <a:endParaRPr lang="en-US" sz="4000" cap="none" dirty="0"/>
-          </a:p>
-        </p:txBody>
-      </p:sp>
-      <p:sp>
-        <p:nvSpPr>
-          <p:cNvPr id="3" name="Content Placeholder 2"/>
-          <p:cNvSpPr>
-            <a:spLocks noGrp="1"/>
-          </p:cNvSpPr>
-          <p:nvPr>
-            <p:ph idx="1"/>
-          </p:nvPr>
-        </p:nvSpPr>
-        <p:spPr/>
-        <p:txBody>
-          <a:bodyPr/>
-          <a:lstStyle/>
-          <a:p>
-            <a:pPr>
-              <a:buFont typeface="Wingdings" panose="05000000000000000000" pitchFamily="2" charset="2"/>
-              <a:buChar char="q"/>
-            </a:pPr>
-            <a:r>
-              <a:rPr lang="en-US" dirty="0"/>
-              <a:t> </a:t>
-            </a:r>
-            <a:r>
-              <a:rPr lang="en-US" dirty="0" smtClean="0"/>
-              <a:t>Problem </a:t>
-            </a:r>
-            <a:r>
-              <a:rPr lang="en-US" dirty="0"/>
-              <a:t>with or suggestion for someone’s code</a:t>
-            </a:r>
-            <a:r>
-              <a:rPr lang="en-US" dirty="0" smtClean="0"/>
-              <a:t>?</a:t>
-            </a:r>
-          </a:p>
-          <a:p>
-            <a:pPr marL="560070" lvl="2" indent="-285750">
-              <a:spcBef>
-                <a:spcPts val="1200"/>
-              </a:spcBef>
-              <a:spcAft>
-                <a:spcPts val="0"/>
-              </a:spcAft>
-              <a:buFont typeface="Wingdings" panose="05000000000000000000" pitchFamily="2" charset="2"/>
-              <a:buChar char="Ø"/>
-            </a:pPr>
-            <a:r>
-              <a:rPr lang="en-US" dirty="0"/>
-              <a:t>Point it out as an </a:t>
-            </a:r>
-            <a:r>
-              <a:rPr lang="en-US" dirty="0" smtClean="0"/>
-              <a:t>Issue</a:t>
-            </a:r>
-          </a:p>
-          <a:p>
-            <a:pPr marL="560070" lvl="2" indent="-285750">
-              <a:spcBef>
-                <a:spcPts val="1200"/>
-              </a:spcBef>
-              <a:spcAft>
-                <a:spcPts val="0"/>
-              </a:spcAft>
-              <a:buFont typeface="Wingdings" panose="05000000000000000000" pitchFamily="2" charset="2"/>
-              <a:buChar char="Ø"/>
-            </a:pPr>
-            <a:endParaRPr lang="en-US" dirty="0" smtClean="0"/>
-          </a:p>
-          <a:p>
-            <a:pPr>
-              <a:buFont typeface="Wingdings" panose="05000000000000000000" pitchFamily="2" charset="2"/>
-              <a:buChar char="q"/>
-            </a:pPr>
-            <a:r>
-              <a:rPr lang="en-US" dirty="0" smtClean="0"/>
-              <a:t> Provide </a:t>
-            </a:r>
-            <a:r>
-              <a:rPr lang="en-US" dirty="0"/>
-              <a:t>a </a:t>
-            </a:r>
-            <a:r>
-              <a:rPr lang="en-US" dirty="0" smtClean="0"/>
-              <a:t>fix or better solution or suggesting a change to an existing repo</a:t>
-            </a:r>
-          </a:p>
-          <a:p>
-            <a:pPr lvl="1">
-              <a:buFont typeface="Wingdings" panose="05000000000000000000" pitchFamily="2" charset="2"/>
-              <a:buChar char="Ø"/>
-            </a:pPr>
-            <a:r>
-              <a:rPr lang="en-US" dirty="0" smtClean="0"/>
-              <a:t>Fork </a:t>
-            </a:r>
-            <a:r>
-              <a:rPr lang="en-US" dirty="0"/>
-              <a:t>the </a:t>
-            </a:r>
-            <a:r>
-              <a:rPr lang="en-US" dirty="0" smtClean="0"/>
-              <a:t>repository</a:t>
-            </a:r>
-            <a:endParaRPr lang="en-US" dirty="0"/>
-          </a:p>
-          <a:p>
-            <a:pPr lvl="1">
-              <a:buFont typeface="Wingdings" panose="05000000000000000000" pitchFamily="2" charset="2"/>
-              <a:buChar char="Ø"/>
-            </a:pPr>
-            <a:r>
-              <a:rPr lang="en-US" dirty="0" smtClean="0"/>
-              <a:t> Clone </a:t>
-            </a:r>
-            <a:r>
-              <a:rPr lang="en-US" dirty="0"/>
-              <a:t>your version of </a:t>
-            </a:r>
-            <a:r>
-              <a:rPr lang="en-US" dirty="0" smtClean="0"/>
-              <a:t>it – </a:t>
-            </a:r>
-            <a:r>
-              <a:rPr lang="en-US" dirty="0" err="1" smtClean="0"/>
-              <a:t>git</a:t>
-            </a:r>
-            <a:r>
-              <a:rPr lang="en-US" dirty="0" smtClean="0"/>
-              <a:t> </a:t>
-            </a:r>
-            <a:r>
-              <a:rPr lang="en-US" dirty="0"/>
-              <a:t>clone https://github.com/InnocentSuta/IndabaxTZ</a:t>
-            </a:r>
-            <a:endParaRPr lang="en-US" dirty="0" smtClean="0"/>
-          </a:p>
-          <a:p>
-            <a:pPr lvl="1">
-              <a:buFont typeface="Wingdings" panose="05000000000000000000" pitchFamily="2" charset="2"/>
-              <a:buChar char="Ø"/>
-            </a:pPr>
-            <a:r>
-              <a:rPr lang="en-US" dirty="0" smtClean="0"/>
-              <a:t>Modify / change things locally - </a:t>
-            </a:r>
-            <a:r>
-              <a:rPr lang="en-US" dirty="0" err="1"/>
-              <a:t>git</a:t>
-            </a:r>
-            <a:r>
-              <a:rPr lang="en-US" dirty="0"/>
-              <a:t> </a:t>
-            </a:r>
-            <a:r>
-              <a:rPr lang="en-US" dirty="0" smtClean="0"/>
-              <a:t>add</a:t>
-            </a:r>
-          </a:p>
-          <a:p>
-            <a:pPr lvl="1">
-              <a:buFont typeface="Wingdings" panose="05000000000000000000" pitchFamily="2" charset="2"/>
-              <a:buChar char="Ø"/>
-            </a:pPr>
-            <a:r>
-              <a:rPr lang="en-US" dirty="0" smtClean="0"/>
-              <a:t>Commit changes – </a:t>
-            </a:r>
-            <a:r>
-              <a:rPr lang="en-US" dirty="0" err="1" smtClean="0"/>
-              <a:t>git</a:t>
-            </a:r>
-            <a:r>
-              <a:rPr lang="en-US" dirty="0" smtClean="0"/>
-              <a:t> commit</a:t>
-            </a:r>
-          </a:p>
-          <a:p>
-            <a:pPr lvl="1">
-              <a:buFont typeface="Wingdings" panose="05000000000000000000" pitchFamily="2" charset="2"/>
-              <a:buChar char="Ø"/>
-            </a:pPr>
-            <a:r>
-              <a:rPr lang="en-US" dirty="0" smtClean="0"/>
-              <a:t>Push to your repository  - </a:t>
-            </a:r>
-            <a:r>
-              <a:rPr lang="en-US" dirty="0" err="1" smtClean="0"/>
-              <a:t>git</a:t>
-            </a:r>
-            <a:r>
-              <a:rPr lang="en-US" dirty="0" smtClean="0"/>
-              <a:t> push</a:t>
-            </a:r>
-          </a:p>
-          <a:p>
-            <a:pPr lvl="1">
-              <a:buFont typeface="Wingdings" panose="05000000000000000000" pitchFamily="2" charset="2"/>
-              <a:buChar char="Ø"/>
-            </a:pPr>
-            <a:r>
-              <a:rPr lang="en-US" dirty="0" smtClean="0"/>
-              <a:t>Submit a Pull Request - </a:t>
-            </a:r>
-            <a:r>
-              <a:rPr lang="en-US" dirty="0"/>
-              <a:t>“Pull Requests” and “New pull request</a:t>
-            </a:r>
-            <a:r>
-              <a:rPr lang="en-US" dirty="0" smtClean="0"/>
-              <a:t>”</a:t>
-            </a:r>
-            <a:endParaRPr lang="en-US" dirty="0"/>
-          </a:p>
-        </p:txBody>
-      </p:sp>
-    </p:spTree>
-    <p:extLst>
-      <p:ext uri="{BB962C8B-B14F-4D97-AF65-F5344CB8AC3E}">
-        <p14:creationId xmlns:p14="http://schemas.microsoft.com/office/powerpoint/2010/main" val="673486164"/>
-      </p:ext>
-    </p:extLst>
-  </p:cSld>
-  <p:clrMapOvr>
-    <a:masterClrMapping/>
-  </p:clrMapOvr>
-  <p:timing>
-    <p:tnLst>
-      <p:par>
-        <p:cTn id="1" dur="indefinite" restart="never" nodeType="tmRoot"/>
-      </p:par>
-    </p:tnLst>
-  </p:timing>
-</p:sld>
-</file>
-
-<file path=ppt/slides/slide25.xml><?xml version="1.0" encoding="utf-8"?>
-<p:sld xmlns:a="http://schemas.openxmlformats.org/drawingml/2006/main" xmlns:r="http://schemas.openxmlformats.org/officeDocument/2006/relationships" xmlns:p="http://schemas.openxmlformats.org/presentationml/2006/main">
-  <p:cSld>
-    <p:spTree>
-      <p:nvGrpSpPr>
-        <p:cNvPr id="1" name=""/>
-        <p:cNvGrpSpPr/>
-        <p:nvPr/>
-      </p:nvGrpSpPr>
-      <p:grpSpPr>
-        <a:xfrm>
-          <a:off x="0" y="0"/>
-          <a:ext cx="0" cy="0"/>
-          <a:chOff x="0" y="0"/>
-          <a:chExt cx="0" cy="0"/>
-        </a:xfrm>
-      </p:grpSpPr>
-      <p:sp>
-        <p:nvSpPr>
-          <p:cNvPr id="2" name="Title 1"/>
-          <p:cNvSpPr>
-            <a:spLocks noGrp="1"/>
-          </p:cNvSpPr>
-          <p:nvPr>
-            <p:ph type="title"/>
-          </p:nvPr>
-        </p:nvSpPr>
-        <p:spPr>
-          <a:xfrm>
             <a:off x="742302" y="2518149"/>
             <a:ext cx="10058400" cy="1609344"/>
           </a:xfrm>
@@ -7446,7 +7388,7 @@
 </p:sld>
 </file>
 
-<file path=ppt/slides/slide26.xml><?xml version="1.0" encoding="utf-8"?>
+<file path=ppt/slides/slide25.xml><?xml version="1.0" encoding="utf-8"?>
 <p:sld xmlns:a="http://schemas.openxmlformats.org/drawingml/2006/main" xmlns:r="http://schemas.openxmlformats.org/officeDocument/2006/relationships" xmlns:p="http://schemas.openxmlformats.org/presentationml/2006/main">
   <p:cSld>
     <p:spTree>
@@ -7513,7 +7455,7 @@
 </p:sld>
 </file>
 
-<file path=ppt/slides/slide27.xml><?xml version="1.0" encoding="utf-8"?>
+<file path=ppt/slides/slide26.xml><?xml version="1.0" encoding="utf-8"?>
 <p:sld xmlns:a="http://schemas.openxmlformats.org/drawingml/2006/main" xmlns:r="http://schemas.openxmlformats.org/officeDocument/2006/relationships" xmlns:p="http://schemas.openxmlformats.org/presentationml/2006/main">
   <p:cSld>
     <p:spTree>
@@ -7569,7 +7511,7 @@
 </p:sld>
 </file>
 
-<file path=ppt/slides/slide28.xml><?xml version="1.0" encoding="utf-8"?>
+<file path=ppt/slides/slide27.xml><?xml version="1.0" encoding="utf-8"?>
 <p:sld xmlns:a="http://schemas.openxmlformats.org/drawingml/2006/main" xmlns:r="http://schemas.openxmlformats.org/officeDocument/2006/relationships" xmlns:p="http://schemas.openxmlformats.org/presentationml/2006/main">
   <p:cSld>
     <p:spTree>
@@ -7642,171 +7584,6 @@
 </file>
 
 <file path=ppt/slides/slide3.xml><?xml version="1.0" encoding="utf-8"?>
-<p:sld xmlns:a="http://schemas.openxmlformats.org/drawingml/2006/main" xmlns:r="http://schemas.openxmlformats.org/officeDocument/2006/relationships" xmlns:p="http://schemas.openxmlformats.org/presentationml/2006/main">
-  <p:cSld>
-    <p:spTree>
-      <p:nvGrpSpPr>
-        <p:cNvPr id="1" name=""/>
-        <p:cNvGrpSpPr/>
-        <p:nvPr/>
-      </p:nvGrpSpPr>
-      <p:grpSpPr>
-        <a:xfrm>
-          <a:off x="0" y="0"/>
-          <a:ext cx="0" cy="0"/>
-          <a:chOff x="0" y="0"/>
-          <a:chExt cx="0" cy="0"/>
-        </a:xfrm>
-      </p:grpSpPr>
-      <p:sp>
-        <p:nvSpPr>
-          <p:cNvPr id="2" name="Title 1"/>
-          <p:cNvSpPr>
-            <a:spLocks noGrp="1"/>
-          </p:cNvSpPr>
-          <p:nvPr>
-            <p:ph type="title"/>
-          </p:nvPr>
-        </p:nvSpPr>
-        <p:spPr/>
-        <p:txBody>
-          <a:bodyPr>
-            <a:normAutofit/>
-          </a:bodyPr>
-          <a:lstStyle/>
-          <a:p>
-            <a:r>
-              <a:rPr lang="en-US" sz="3600" cap="none" dirty="0" smtClean="0"/>
-              <a:t>Challenges of working on a project</a:t>
-            </a:r>
-            <a:endParaRPr lang="en-US" sz="3600" cap="none" dirty="0"/>
-          </a:p>
-        </p:txBody>
-      </p:sp>
-      <p:sp>
-        <p:nvSpPr>
-          <p:cNvPr id="3" name="Content Placeholder 2"/>
-          <p:cNvSpPr>
-            <a:spLocks noGrp="1"/>
-          </p:cNvSpPr>
-          <p:nvPr>
-            <p:ph idx="1"/>
-          </p:nvPr>
-        </p:nvSpPr>
-        <p:spPr>
-          <a:xfrm>
-            <a:off x="484910" y="2249486"/>
-            <a:ext cx="10562502" cy="3583277"/>
-          </a:xfrm>
-        </p:spPr>
-        <p:txBody>
-          <a:bodyPr/>
-          <a:lstStyle/>
-          <a:p>
-            <a:pPr marL="0" indent="0">
-              <a:buNone/>
-            </a:pPr>
-            <a:r>
-              <a:rPr lang="en-US" dirty="0"/>
-              <a:t>• Undo and Redo</a:t>
-            </a:r>
-            <a:r>
-              <a:rPr lang="en-US" dirty="0" smtClean="0"/>
-              <a:t/>
-            </a:r>
-            <a:br>
-              <a:rPr lang="en-US" dirty="0" smtClean="0"/>
-            </a:br>
-            <a:r>
-              <a:rPr lang="en-US" dirty="0"/>
-              <a:t>• Tracking changes</a:t>
-            </a:r>
-            <a:r>
-              <a:rPr lang="en-US" dirty="0" smtClean="0"/>
-              <a:t/>
-            </a:r>
-            <a:br>
-              <a:rPr lang="en-US" dirty="0" smtClean="0"/>
-            </a:br>
-            <a:r>
-              <a:rPr lang="en-US" dirty="0"/>
-              <a:t>• Working with others</a:t>
-            </a:r>
-            <a:r>
-              <a:rPr lang="en-US" dirty="0" smtClean="0"/>
-              <a:t/>
-            </a:r>
-            <a:br>
-              <a:rPr lang="en-US" dirty="0" smtClean="0"/>
-            </a:br>
-            <a:r>
-              <a:rPr lang="en-US" dirty="0"/>
-              <a:t>• Sharing Changes</a:t>
-            </a:r>
-            <a:r>
-              <a:rPr lang="en-US" dirty="0" smtClean="0"/>
-              <a:t/>
-            </a:r>
-            <a:br>
-              <a:rPr lang="en-US" dirty="0" smtClean="0"/>
-            </a:br>
-            <a:r>
-              <a:rPr lang="en-US" dirty="0"/>
-              <a:t>• Overlapping </a:t>
-            </a:r>
-            <a:r>
-              <a:rPr lang="en-US" dirty="0" smtClean="0"/>
-              <a:t>work when working in a team</a:t>
-            </a:r>
-            <a:endParaRPr lang="en-US" dirty="0"/>
-          </a:p>
-        </p:txBody>
-      </p:sp>
-      <p:pic>
-        <p:nvPicPr>
-          <p:cNvPr id="5" name="Picture 4"/>
-          <p:cNvPicPr>
-            <a:picLocks noChangeAspect="1"/>
-          </p:cNvPicPr>
-          <p:nvPr/>
-        </p:nvPicPr>
-        <p:blipFill>
-          <a:blip r:embed="rId2"/>
-          <a:stretch>
-            <a:fillRect/>
-          </a:stretch>
-        </p:blipFill>
-        <p:spPr>
-          <a:xfrm>
-            <a:off x="6094411" y="1936968"/>
-            <a:ext cx="5820498" cy="3701831"/>
-          </a:xfrm>
-          <a:prstGeom prst="rect">
-            <a:avLst/>
-          </a:prstGeom>
-        </p:spPr>
-      </p:pic>
-    </p:spTree>
-    <p:extLst>
-      <p:ext uri="{BB962C8B-B14F-4D97-AF65-F5344CB8AC3E}">
-        <p14:creationId xmlns:p14="http://schemas.microsoft.com/office/powerpoint/2010/main" val="199443762"/>
-      </p:ext>
-    </p:extLst>
-  </p:cSld>
-  <p:clrMapOvr>
-    <a:masterClrMapping/>
-  </p:clrMapOvr>
-  <p:timing>
-    <p:tnLst>
-      <p:par>
-        <p:cTn id="1" dur="indefinite" restart="never" nodeType="tmRoot"/>
-      </p:par>
-    </p:tnLst>
-  </p:timing>
-</p:sld>
-</file>
-
-<file path=ppt/slides/slide4.xml><?xml version="1.0" encoding="utf-8"?>
 <p:sld xmlns:a="http://schemas.openxmlformats.org/drawingml/2006/main" xmlns:r="http://schemas.openxmlformats.org/officeDocument/2006/relationships" xmlns:p="http://schemas.openxmlformats.org/presentationml/2006/main">
   <p:cSld>
     <p:spTree>
@@ -7872,6 +7649,254 @@
 </p:sld>
 </file>
 
+<file path=ppt/slides/slide4.xml><?xml version="1.0" encoding="utf-8"?>
+<p:sld xmlns:a="http://schemas.openxmlformats.org/drawingml/2006/main" xmlns:r="http://schemas.openxmlformats.org/officeDocument/2006/relationships" xmlns:p="http://schemas.openxmlformats.org/presentationml/2006/main">
+  <p:cSld>
+    <p:spTree>
+      <p:nvGrpSpPr>
+        <p:cNvPr id="1" name=""/>
+        <p:cNvGrpSpPr/>
+        <p:nvPr/>
+      </p:nvGrpSpPr>
+      <p:grpSpPr>
+        <a:xfrm>
+          <a:off x="0" y="0"/>
+          <a:ext cx="0" cy="0"/>
+          <a:chOff x="0" y="0"/>
+          <a:chExt cx="0" cy="0"/>
+        </a:xfrm>
+      </p:grpSpPr>
+      <p:sp>
+        <p:nvSpPr>
+          <p:cNvPr id="2" name="Title 1"/>
+          <p:cNvSpPr>
+            <a:spLocks noGrp="1"/>
+          </p:cNvSpPr>
+          <p:nvPr>
+            <p:ph type="title"/>
+          </p:nvPr>
+        </p:nvSpPr>
+        <p:spPr/>
+        <p:txBody>
+          <a:bodyPr>
+            <a:normAutofit/>
+          </a:bodyPr>
+          <a:lstStyle/>
+          <a:p>
+            <a:pPr algn="ctr"/>
+            <a:r>
+              <a:rPr lang="en-US" sz="4000" cap="none" dirty="0" smtClean="0"/>
+              <a:t>Why use version control?</a:t>
+            </a:r>
+            <a:endParaRPr lang="en-US" sz="4000" cap="none" dirty="0"/>
+          </a:p>
+        </p:txBody>
+      </p:sp>
+      <p:sp>
+        <p:nvSpPr>
+          <p:cNvPr id="3" name="Content Placeholder 2"/>
+          <p:cNvSpPr>
+            <a:spLocks noGrp="1"/>
+          </p:cNvSpPr>
+          <p:nvPr>
+            <p:ph idx="1"/>
+          </p:nvPr>
+        </p:nvSpPr>
+        <p:spPr/>
+        <p:txBody>
+          <a:bodyPr/>
+          <a:lstStyle/>
+          <a:p>
+            <a:pPr>
+              <a:buFont typeface="Wingdings" panose="05000000000000000000" pitchFamily="2" charset="2"/>
+              <a:buChar char="q"/>
+            </a:pPr>
+            <a:endParaRPr lang="en-US" dirty="0" smtClean="0"/>
+          </a:p>
+          <a:p>
+            <a:pPr>
+              <a:buFont typeface="Wingdings" panose="05000000000000000000" pitchFamily="2" charset="2"/>
+              <a:buChar char="q"/>
+            </a:pPr>
+            <a:r>
+              <a:rPr lang="en-US" dirty="0" smtClean="0"/>
+              <a:t> History </a:t>
+            </a:r>
+            <a:r>
+              <a:rPr lang="en-US" dirty="0"/>
+              <a:t>of </a:t>
+            </a:r>
+            <a:r>
+              <a:rPr lang="en-US" dirty="0" smtClean="0"/>
+              <a:t>changes – Eac</a:t>
+            </a:r>
+            <a:r>
+              <a:rPr lang="en-US" dirty="0" smtClean="0"/>
+              <a:t>h file in the local or remote repository has a history </a:t>
+            </a:r>
+            <a:r>
+              <a:rPr lang="en-US" dirty="0"/>
+              <a:t>making it easy to explore the changes that occurred to it at different time </a:t>
+            </a:r>
+            <a:r>
+              <a:rPr lang="en-US" dirty="0" smtClean="0"/>
+              <a:t>points</a:t>
+            </a:r>
+            <a:endParaRPr lang="en-US" dirty="0"/>
+          </a:p>
+          <a:p>
+            <a:pPr>
+              <a:buFont typeface="Wingdings" panose="05000000000000000000" pitchFamily="2" charset="2"/>
+              <a:buChar char="q"/>
+            </a:pPr>
+            <a:r>
+              <a:rPr lang="en-US" dirty="0" smtClean="0"/>
+              <a:t> No </a:t>
+            </a:r>
+            <a:r>
+              <a:rPr lang="en-US" dirty="0"/>
+              <a:t>worries about breaking things that </a:t>
+            </a:r>
+            <a:r>
+              <a:rPr lang="en-US" dirty="0"/>
+              <a:t>work - revert to </a:t>
+            </a:r>
+            <a:r>
+              <a:rPr lang="en-US" dirty="0" smtClean="0"/>
+              <a:t>the previous version</a:t>
+            </a:r>
+            <a:endParaRPr lang="en-US" dirty="0"/>
+          </a:p>
+          <a:p>
+            <a:pPr>
+              <a:buFont typeface="Wingdings" panose="05000000000000000000" pitchFamily="2" charset="2"/>
+              <a:buChar char="q"/>
+            </a:pPr>
+            <a:r>
+              <a:rPr lang="en-US" dirty="0" smtClean="0"/>
+              <a:t> Merging </a:t>
+            </a:r>
+            <a:r>
+              <a:rPr lang="en-US" dirty="0"/>
+              <a:t>changes from multiple </a:t>
+            </a:r>
+            <a:r>
+              <a:rPr lang="en-US" dirty="0" smtClean="0"/>
+              <a:t>people</a:t>
+            </a:r>
+          </a:p>
+          <a:p>
+            <a:pPr>
+              <a:buFont typeface="Wingdings" panose="05000000000000000000" pitchFamily="2" charset="2"/>
+              <a:buChar char="q"/>
+            </a:pPr>
+            <a:r>
+              <a:rPr lang="en-US" dirty="0" smtClean="0"/>
+              <a:t> </a:t>
+            </a:r>
+            <a:r>
+              <a:rPr lang="en-US" dirty="0"/>
+              <a:t>R</a:t>
+            </a:r>
+            <a:r>
+              <a:rPr lang="en-US" dirty="0" smtClean="0"/>
+              <a:t>eview </a:t>
+            </a:r>
+            <a:r>
+              <a:rPr lang="en-US" dirty="0"/>
+              <a:t>other people’s code, add comments to certain lines or the overall </a:t>
+            </a:r>
+            <a:r>
+              <a:rPr lang="en-US" dirty="0" smtClean="0"/>
+              <a:t>document </a:t>
+            </a:r>
+            <a:r>
+              <a:rPr lang="en-US" dirty="0"/>
+              <a:t>and suggest </a:t>
+            </a:r>
+            <a:r>
+              <a:rPr lang="en-US" dirty="0" smtClean="0"/>
+              <a:t>changes.</a:t>
+            </a:r>
+          </a:p>
+          <a:p>
+            <a:pPr marL="182880" lvl="1">
+              <a:spcBef>
+                <a:spcPts val="1200"/>
+              </a:spcBef>
+              <a:spcAft>
+                <a:spcPts val="0"/>
+              </a:spcAft>
+              <a:buFont typeface="Wingdings" panose="05000000000000000000" pitchFamily="2" charset="2"/>
+              <a:buChar char="q"/>
+            </a:pPr>
+            <a:r>
+              <a:rPr lang="en-US" dirty="0" smtClean="0"/>
+              <a:t> Version </a:t>
+            </a:r>
+            <a:r>
+              <a:rPr lang="en-US" dirty="0"/>
+              <a:t>control allows you to keep track of your work and easily navigate among the many versions of the files you create, whilst also maintaining an online </a:t>
+            </a:r>
+            <a:r>
+              <a:rPr lang="en-US" dirty="0" smtClean="0"/>
+              <a:t>backup (</a:t>
+            </a:r>
+            <a:r>
+              <a:rPr lang="en-US" dirty="0" err="1" smtClean="0"/>
+              <a:t>Github</a:t>
+            </a:r>
+            <a:r>
+              <a:rPr lang="en-US" dirty="0" smtClean="0"/>
+              <a:t>, </a:t>
+            </a:r>
+            <a:r>
+              <a:rPr lang="en-US" dirty="0" err="1" smtClean="0"/>
+              <a:t>Bitbucket</a:t>
+            </a:r>
+            <a:r>
+              <a:rPr lang="en-US" dirty="0" smtClean="0"/>
+              <a:t> </a:t>
+            </a:r>
+            <a:r>
+              <a:rPr lang="en-US" dirty="0" err="1" smtClean="0"/>
+              <a:t>etc</a:t>
+            </a:r>
+            <a:r>
+              <a:rPr lang="en-US" dirty="0" smtClean="0"/>
+              <a:t>)</a:t>
+            </a:r>
+            <a:endParaRPr lang="en-US" dirty="0"/>
+          </a:p>
+          <a:p>
+            <a:pPr>
+              <a:buFont typeface="Wingdings" panose="05000000000000000000" pitchFamily="2" charset="2"/>
+              <a:buChar char="q"/>
+            </a:pPr>
+            <a:endParaRPr lang="en-US" dirty="0"/>
+          </a:p>
+        </p:txBody>
+      </p:sp>
+    </p:spTree>
+    <p:extLst>
+      <p:ext uri="{BB962C8B-B14F-4D97-AF65-F5344CB8AC3E}">
+        <p14:creationId xmlns:p14="http://schemas.microsoft.com/office/powerpoint/2010/main" val="240471466"/>
+      </p:ext>
+    </p:extLst>
+  </p:cSld>
+  <p:clrMapOvr>
+    <a:masterClrMapping/>
+  </p:clrMapOvr>
+  <p:timing>
+    <p:tnLst>
+      <p:par>
+        <p:cTn id="1" dur="indefinite" restart="never" nodeType="tmRoot"/>
+      </p:par>
+    </p:tnLst>
+  </p:timing>
+</p:sld>
+</file>
+
 <file path=ppt/slides/slide5.xml><?xml version="1.0" encoding="utf-8"?>
 <p:sld xmlns:a="http://schemas.openxmlformats.org/drawingml/2006/main" xmlns:r="http://schemas.openxmlformats.org/officeDocument/2006/relationships" xmlns:p="http://schemas.openxmlformats.org/presentationml/2006/main">
   <p:cSld>
@@ -7899,7 +7924,12 @@
             <p:ph type="title"/>
           </p:nvPr>
         </p:nvSpPr>
-        <p:spPr/>
+        <p:spPr>
+          <a:xfrm>
+            <a:off x="1069848" y="484632"/>
+            <a:ext cx="10058400" cy="1455004"/>
+          </a:xfrm>
+        </p:spPr>
         <p:txBody>
           <a:bodyPr>
             <a:normAutofit/>
@@ -7909,7 +7939,15 @@
             <a:pPr algn="ctr"/>
             <a:r>
               <a:rPr lang="en-US" sz="4000" cap="none" dirty="0" smtClean="0"/>
-              <a:t>Why use version control?</a:t>
+              <a:t>What is </a:t>
+            </a:r>
+            <a:r>
+              <a:rPr lang="en-US" sz="4000" cap="none" dirty="0" err="1" smtClean="0"/>
+              <a:t>git</a:t>
+            </a:r>
+            <a:r>
+              <a:rPr lang="en-US" sz="4000" cap="none" dirty="0" smtClean="0"/>
+              <a:t>?</a:t>
             </a:r>
             <a:endParaRPr lang="en-US" sz="4000" cap="none" dirty="0"/>
           </a:p>
@@ -7925,15 +7963,71 @@
             <p:ph idx="1"/>
           </p:nvPr>
         </p:nvSpPr>
-        <p:spPr/>
-        <p:txBody>
-          <a:bodyPr/>
+        <p:spPr>
+          <a:xfrm>
+            <a:off x="1069848" y="2161309"/>
+            <a:ext cx="10058400" cy="4010891"/>
+          </a:xfrm>
+        </p:spPr>
+        <p:txBody>
+          <a:bodyPr>
+            <a:normAutofit/>
+          </a:bodyPr>
           <a:lstStyle/>
           <a:p>
             <a:pPr>
               <a:buFont typeface="Wingdings" panose="05000000000000000000" pitchFamily="2" charset="2"/>
               <a:buChar char="q"/>
             </a:pPr>
+            <a:r>
+              <a:rPr lang="en-US" dirty="0"/>
+              <a:t> D</a:t>
+            </a:r>
+            <a:r>
+              <a:rPr lang="en-US" dirty="0" smtClean="0"/>
+              <a:t>istributed </a:t>
+            </a:r>
+            <a:r>
+              <a:rPr lang="en-US" dirty="0"/>
+              <a:t>version control </a:t>
+            </a:r>
+            <a:r>
+              <a:rPr lang="en-US" dirty="0" smtClean="0"/>
+              <a:t>system. </a:t>
+            </a:r>
+          </a:p>
+          <a:p>
+            <a:pPr>
+              <a:buFont typeface="Wingdings" panose="05000000000000000000" pitchFamily="2" charset="2"/>
+              <a:buChar char="q"/>
+            </a:pPr>
+            <a:r>
+              <a:rPr lang="en-US" dirty="0" smtClean="0"/>
+              <a:t> Developed </a:t>
+            </a:r>
+            <a:r>
+              <a:rPr lang="en-US" dirty="0"/>
+              <a:t>by Linus Torvalds (developer of Linux</a:t>
+            </a:r>
+            <a:r>
+              <a:rPr lang="en-US" dirty="0" smtClean="0"/>
+              <a:t>) in 2005. </a:t>
+            </a:r>
+            <a:endParaRPr lang="en-US" dirty="0"/>
+          </a:p>
+          <a:p>
+            <a:pPr lvl="1">
+              <a:buFont typeface="Wingdings" panose="05000000000000000000" pitchFamily="2" charset="2"/>
+              <a:buChar char="Ø"/>
+            </a:pPr>
+            <a:r>
+              <a:rPr lang="en-US" dirty="0" smtClean="0"/>
+              <a:t> </a:t>
+            </a:r>
+            <a:r>
+              <a:rPr lang="en-US" dirty="0"/>
+              <a:t>used to manage the source code for Linux</a:t>
+            </a:r>
             <a:endParaRPr lang="en-US" dirty="0" smtClean="0"/>
           </a:p>
           <a:p>
@@ -7943,94 +8037,105 @@
             </a:pPr>
             <a:r>
               <a:rPr lang="en-US" dirty="0" smtClean="0"/>
-              <a:t> History </a:t>
-            </a:r>
-            <a:r>
-              <a:rPr lang="en-US" dirty="0"/>
-              <a:t>of </a:t>
-            </a:r>
-            <a:r>
-              <a:rPr lang="en-US" dirty="0" smtClean="0"/>
-              <a:t>changes</a:t>
-            </a:r>
-          </a:p>
-          <a:p>
-            <a:pPr>
-              <a:buFont typeface="Wingdings" panose="05000000000000000000" pitchFamily="2" charset="2"/>
-              <a:buChar char="q"/>
+              <a:t>  Track any content.</a:t>
+            </a:r>
+          </a:p>
+          <a:p>
+            <a:pPr lvl="1">
+              <a:buFont typeface="Wingdings" panose="05000000000000000000" pitchFamily="2" charset="2"/>
+              <a:buChar char="Ø"/>
+            </a:pPr>
+            <a:r>
+              <a:rPr lang="en-US" dirty="0" smtClean="0"/>
+              <a:t>Source code</a:t>
+            </a:r>
+          </a:p>
+          <a:p>
+            <a:pPr lvl="1">
+              <a:buFont typeface="Wingdings" panose="05000000000000000000" pitchFamily="2" charset="2"/>
+              <a:buChar char="Ø"/>
+            </a:pPr>
+            <a:r>
+              <a:rPr lang="en-US" dirty="0" smtClean="0"/>
+              <a:t>data </a:t>
+            </a:r>
+            <a:r>
+              <a:rPr lang="en-US" dirty="0"/>
+              <a:t>analysis </a:t>
+            </a:r>
+            <a:r>
+              <a:rPr lang="en-US" dirty="0" smtClean="0"/>
+              <a:t>projects</a:t>
+            </a:r>
+          </a:p>
+          <a:p>
+            <a:pPr lvl="1">
+              <a:buFont typeface="Wingdings" panose="05000000000000000000" pitchFamily="2" charset="2"/>
+              <a:buChar char="Ø"/>
+            </a:pPr>
+            <a:r>
+              <a:rPr lang="en-US" dirty="0" smtClean="0"/>
+              <a:t>Manuscripts</a:t>
+            </a:r>
+          </a:p>
+          <a:p>
+            <a:pPr lvl="1">
+              <a:buFont typeface="Wingdings" panose="05000000000000000000" pitchFamily="2" charset="2"/>
+              <a:buChar char="Ø"/>
+            </a:pPr>
+            <a:r>
+              <a:rPr lang="en-US" dirty="0" smtClean="0"/>
+              <a:t>Websites</a:t>
+            </a:r>
+          </a:p>
+          <a:p>
+            <a:pPr marL="274320" lvl="1" indent="0">
+              <a:buNone/>
+            </a:pPr>
+            <a:endParaRPr lang="en-US" dirty="0" smtClean="0"/>
+          </a:p>
+          <a:p>
+            <a:pPr marL="274320" lvl="1" indent="0">
+              <a:buNone/>
             </a:pPr>
             <a:endParaRPr lang="en-US" dirty="0"/>
           </a:p>
           <a:p>
-            <a:pPr>
-              <a:buFont typeface="Wingdings" panose="05000000000000000000" pitchFamily="2" charset="2"/>
-              <a:buChar char="q"/>
-            </a:pPr>
-            <a:r>
-              <a:rPr lang="en-US" dirty="0" smtClean="0"/>
-              <a:t> Able </a:t>
-            </a:r>
-            <a:r>
-              <a:rPr lang="en-US" dirty="0"/>
-              <a:t>to go </a:t>
-            </a:r>
-            <a:r>
-              <a:rPr lang="en-US" dirty="0" smtClean="0"/>
-              <a:t>back</a:t>
-            </a:r>
-          </a:p>
-          <a:p>
-            <a:pPr>
-              <a:buFont typeface="Wingdings" panose="05000000000000000000" pitchFamily="2" charset="2"/>
-              <a:buChar char="q"/>
-            </a:pPr>
-            <a:endParaRPr lang="en-US" dirty="0"/>
-          </a:p>
-          <a:p>
-            <a:pPr>
-              <a:buFont typeface="Wingdings" panose="05000000000000000000" pitchFamily="2" charset="2"/>
-              <a:buChar char="q"/>
-            </a:pPr>
-            <a:r>
-              <a:rPr lang="en-US" dirty="0" smtClean="0"/>
-              <a:t> No </a:t>
-            </a:r>
-            <a:r>
-              <a:rPr lang="en-US" dirty="0"/>
-              <a:t>worries about breaking things that </a:t>
-            </a:r>
-            <a:r>
-              <a:rPr lang="en-US" dirty="0" smtClean="0"/>
-              <a:t>work</a:t>
-            </a:r>
-          </a:p>
-          <a:p>
-            <a:pPr>
-              <a:buFont typeface="Wingdings" panose="05000000000000000000" pitchFamily="2" charset="2"/>
-              <a:buChar char="q"/>
-            </a:pPr>
-            <a:endParaRPr lang="en-US" dirty="0"/>
-          </a:p>
-          <a:p>
-            <a:pPr>
-              <a:buFont typeface="Wingdings" panose="05000000000000000000" pitchFamily="2" charset="2"/>
-              <a:buChar char="q"/>
-            </a:pPr>
-            <a:r>
-              <a:rPr lang="en-US" dirty="0" smtClean="0"/>
-              <a:t> Merging </a:t>
-            </a:r>
-            <a:r>
-              <a:rPr lang="en-US" dirty="0"/>
-              <a:t>changes from multiple people</a:t>
-            </a:r>
+            <a:pPr marL="274320" lvl="1" indent="0">
+              <a:buNone/>
+            </a:pPr>
+            <a:r>
+              <a:rPr lang="en-US" dirty="0" err="1" smtClean="0"/>
+              <a:t>Git</a:t>
+            </a:r>
+            <a:r>
+              <a:rPr lang="en-US" dirty="0" smtClean="0"/>
+              <a:t> makes </a:t>
+            </a:r>
+            <a:r>
+              <a:rPr lang="en-US" dirty="0"/>
+              <a:t>version </a:t>
+            </a:r>
+            <a:r>
+              <a:rPr lang="en-US" dirty="0" smtClean="0"/>
+              <a:t>control </a:t>
+            </a:r>
+            <a:r>
+              <a:rPr lang="en-US" dirty="0"/>
+              <a:t>much smoother and easier to </a:t>
+            </a:r>
+            <a:r>
+              <a:rPr lang="en-US" dirty="0" smtClean="0"/>
+              <a:t>implement.</a:t>
+            </a:r>
+            <a:endParaRPr lang="en-US" dirty="0" smtClean="0"/>
           </a:p>
         </p:txBody>
       </p:sp>
     </p:spTree>
     <p:extLst>
       <p:ext uri="{BB962C8B-B14F-4D97-AF65-F5344CB8AC3E}">
-        <p14:creationId xmlns:p14="http://schemas.microsoft.com/office/powerpoint/2010/main" val="240471466"/>
+        <p14:creationId xmlns:p14="http://schemas.microsoft.com/office/powerpoint/2010/main" val="1589313165"/>
       </p:ext>
     </p:extLst>
   </p:cSld>
@@ -8074,12 +8179,7 @@
             <p:ph type="title"/>
           </p:nvPr>
         </p:nvSpPr>
-        <p:spPr>
-          <a:xfrm>
-            <a:off x="1069848" y="484632"/>
-            <a:ext cx="10058400" cy="1455004"/>
-          </a:xfrm>
-        </p:spPr>
+        <p:spPr/>
         <p:txBody>
           <a:bodyPr>
             <a:normAutofit/>
@@ -8089,7 +8189,7 @@
             <a:pPr algn="ctr"/>
             <a:r>
               <a:rPr lang="en-US" sz="4000" cap="none" dirty="0" smtClean="0"/>
-              <a:t>What is </a:t>
+              <a:t>Why use </a:t>
             </a:r>
             <a:r>
               <a:rPr lang="en-US" sz="4000" cap="none" dirty="0" err="1" smtClean="0"/>
@@ -8113,12 +8213,7 @@
             <p:ph idx="1"/>
           </p:nvPr>
         </p:nvSpPr>
-        <p:spPr>
-          <a:xfrm>
-            <a:off x="1069848" y="2161309"/>
-            <a:ext cx="10058400" cy="4010891"/>
-          </a:xfrm>
-        </p:spPr>
+        <p:spPr/>
         <p:txBody>
           <a:bodyPr>
             <a:normAutofit/>
@@ -8130,20 +8225,16 @@
               <a:buChar char="q"/>
             </a:pPr>
             <a:r>
-              <a:rPr lang="en-US" dirty="0"/>
-              <a:t> D</a:t>
-            </a:r>
-            <a:r>
-              <a:rPr lang="en-US" dirty="0" smtClean="0"/>
-              <a:t>istributed </a:t>
-            </a:r>
-            <a:r>
-              <a:rPr lang="en-US" dirty="0"/>
-              <a:t>version control </a:t>
-            </a:r>
-            <a:r>
-              <a:rPr lang="en-US" dirty="0" smtClean="0"/>
-              <a:t>system. </a:t>
+              <a:rPr lang="en-US" dirty="0" smtClean="0"/>
+              <a:t> It’s fast - </a:t>
+            </a:r>
+            <a:r>
+              <a:rPr lang="en-US" dirty="0"/>
+              <a:t>Applying updates should not take longer than 3 </a:t>
+            </a:r>
+            <a:r>
+              <a:rPr lang="en-US" dirty="0" smtClean="0"/>
+              <a:t>seconds</a:t>
             </a:r>
           </a:p>
           <a:p>
@@ -8151,33 +8242,31 @@
               <a:buFont typeface="Wingdings" panose="05000000000000000000" pitchFamily="2" charset="2"/>
               <a:buChar char="q"/>
             </a:pPr>
-            <a:r>
-              <a:rPr lang="en-US" dirty="0" smtClean="0"/>
-              <a:t> Developed </a:t>
-            </a:r>
-            <a:r>
-              <a:rPr lang="en-US" dirty="0"/>
-              <a:t>by Linus Torvalds (developer of Linux</a:t>
-            </a:r>
-            <a:r>
-              <a:rPr lang="en-US" dirty="0" smtClean="0"/>
-              <a:t>) in 2005. </a:t>
-            </a:r>
             <a:endParaRPr lang="en-US" dirty="0"/>
           </a:p>
           <a:p>
-            <a:pPr lvl="1">
-              <a:buFont typeface="Wingdings" panose="05000000000000000000" pitchFamily="2" charset="2"/>
-              <a:buChar char="Ø"/>
-            </a:pPr>
-            <a:r>
-              <a:rPr lang="en-US" dirty="0" smtClean="0"/>
-              <a:t> </a:t>
-            </a:r>
-            <a:r>
-              <a:rPr lang="en-US" dirty="0"/>
-              <a:t>used to manage the source code for Linux</a:t>
-            </a:r>
+            <a:pPr>
+              <a:buFont typeface="Wingdings" panose="05000000000000000000" pitchFamily="2" charset="2"/>
+              <a:buChar char="q"/>
+            </a:pPr>
+            <a:r>
+              <a:rPr lang="en-US" dirty="0" smtClean="0"/>
+              <a:t>  </a:t>
+            </a:r>
+            <a:r>
+              <a:rPr lang="en-US" dirty="0"/>
+              <a:t>You don’t need access to a </a:t>
+            </a:r>
+            <a:r>
+              <a:rPr lang="en-US" dirty="0" smtClean="0"/>
+              <a:t>server</a:t>
+            </a:r>
+          </a:p>
+          <a:p>
+            <a:pPr>
+              <a:buFont typeface="Wingdings" panose="05000000000000000000" pitchFamily="2" charset="2"/>
+              <a:buChar char="q"/>
+            </a:pPr>
             <a:endParaRPr lang="en-US" dirty="0" smtClean="0"/>
           </a:p>
           <a:p>
@@ -8187,68 +8276,81 @@
             </a:pPr>
             <a:r>
               <a:rPr lang="en-US" dirty="0" smtClean="0"/>
-              <a:t>  </a:t>
-            </a:r>
-            <a:r>
-              <a:rPr lang="en-US" dirty="0" smtClean="0"/>
-              <a:t>Track any content.</a:t>
-            </a:r>
+              <a:t> Support </a:t>
+            </a:r>
+            <a:r>
+              <a:rPr lang="en-US" dirty="0"/>
+              <a:t>distributed system </a:t>
+            </a:r>
+            <a:r>
+              <a:rPr lang="en-US" dirty="0" smtClean="0"/>
+              <a:t>workflow</a:t>
+            </a:r>
+          </a:p>
+          <a:p>
+            <a:pPr>
+              <a:buFont typeface="Wingdings" panose="05000000000000000000" pitchFamily="2" charset="2"/>
+              <a:buChar char="q"/>
+            </a:pPr>
+            <a:endParaRPr lang="en-US" dirty="0"/>
+          </a:p>
+          <a:p>
+            <a:pPr>
+              <a:buFont typeface="Wingdings" panose="05000000000000000000" pitchFamily="2" charset="2"/>
+              <a:buChar char="q"/>
+            </a:pPr>
+            <a:r>
+              <a:rPr lang="en-US" dirty="0" smtClean="0"/>
+              <a:t> Amazingly </a:t>
+            </a:r>
+            <a:r>
+              <a:rPr lang="en-US" dirty="0"/>
+              <a:t>good at merging simultaneous </a:t>
+            </a:r>
+            <a:r>
+              <a:rPr lang="en-US" dirty="0" smtClean="0"/>
+              <a:t>changes</a:t>
+            </a:r>
+          </a:p>
+          <a:p>
+            <a:pPr>
+              <a:buFont typeface="Wingdings" panose="05000000000000000000" pitchFamily="2" charset="2"/>
+              <a:buChar char="q"/>
+            </a:pPr>
             <a:endParaRPr lang="en-US" dirty="0" smtClean="0"/>
           </a:p>
           <a:p>
-            <a:pPr lvl="1">
-              <a:buFont typeface="Wingdings" panose="05000000000000000000" pitchFamily="2" charset="2"/>
-              <a:buChar char="Ø"/>
-            </a:pPr>
-            <a:r>
-              <a:rPr lang="en-US" dirty="0" smtClean="0"/>
-              <a:t>Source code</a:t>
-            </a:r>
-          </a:p>
-          <a:p>
-            <a:pPr lvl="1">
-              <a:buFont typeface="Wingdings" panose="05000000000000000000" pitchFamily="2" charset="2"/>
-              <a:buChar char="Ø"/>
-            </a:pPr>
-            <a:r>
-              <a:rPr lang="en-US" dirty="0" smtClean="0"/>
-              <a:t>data </a:t>
-            </a:r>
-            <a:r>
-              <a:rPr lang="en-US" dirty="0"/>
-              <a:t>analysis </a:t>
-            </a:r>
-            <a:r>
-              <a:rPr lang="en-US" dirty="0" smtClean="0"/>
-              <a:t>projects</a:t>
-            </a:r>
-          </a:p>
-          <a:p>
-            <a:pPr lvl="1">
-              <a:buFont typeface="Wingdings" panose="05000000000000000000" pitchFamily="2" charset="2"/>
-              <a:buChar char="Ø"/>
-            </a:pPr>
-            <a:r>
-              <a:rPr lang="en-US" dirty="0" smtClean="0"/>
-              <a:t>Manuscripts</a:t>
-            </a:r>
-          </a:p>
-          <a:p>
-            <a:pPr lvl="1">
-              <a:buFont typeface="Wingdings" panose="05000000000000000000" pitchFamily="2" charset="2"/>
-              <a:buChar char="Ø"/>
-            </a:pPr>
-            <a:r>
-              <a:rPr lang="en-US" dirty="0" smtClean="0"/>
-              <a:t>Websites</a:t>
-            </a:r>
+            <a:pPr>
+              <a:buFont typeface="Wingdings" panose="05000000000000000000" pitchFamily="2" charset="2"/>
+              <a:buChar char="q"/>
+            </a:pPr>
+            <a:r>
+              <a:rPr lang="en-US" dirty="0" smtClean="0"/>
+              <a:t> Take the Concurrent </a:t>
+            </a:r>
+            <a:r>
+              <a:rPr lang="en-US" dirty="0"/>
+              <a:t>Version </a:t>
+            </a:r>
+            <a:r>
+              <a:rPr lang="en-US" dirty="0" smtClean="0"/>
+              <a:t>System - (free and Paid software) </a:t>
+            </a:r>
+            <a:endParaRPr lang="en-US" dirty="0" smtClean="0"/>
+          </a:p>
+          <a:p>
+            <a:pPr>
+              <a:buFont typeface="Wingdings" panose="05000000000000000000" pitchFamily="2" charset="2"/>
+              <a:buChar char="q"/>
+            </a:pPr>
+            <a:endParaRPr lang="en-US" dirty="0"/>
           </a:p>
         </p:txBody>
       </p:sp>
     </p:spTree>
     <p:extLst>
       <p:ext uri="{BB962C8B-B14F-4D97-AF65-F5344CB8AC3E}">
-        <p14:creationId xmlns:p14="http://schemas.microsoft.com/office/powerpoint/2010/main" val="1589313165"/>
+        <p14:creationId xmlns:p14="http://schemas.microsoft.com/office/powerpoint/2010/main" val="401565576"/>
       </p:ext>
     </p:extLst>
   </p:cSld>
@@ -8301,16 +8403,12 @@
           <a:p>
             <a:pPr algn="ctr"/>
             <a:r>
+              <a:rPr lang="en-US" sz="4000" cap="none" dirty="0" err="1" smtClean="0"/>
+              <a:t>Git</a:t>
+            </a:r>
+            <a:r>
               <a:rPr lang="en-US" sz="4000" cap="none" dirty="0" smtClean="0"/>
-              <a:t>Why use </a:t>
-            </a:r>
-            <a:r>
-              <a:rPr lang="en-US" sz="4000" cap="none" dirty="0" err="1" smtClean="0"/>
-              <a:t>git</a:t>
-            </a:r>
-            <a:r>
-              <a:rPr lang="en-US" sz="4000" cap="none" dirty="0" smtClean="0"/>
-              <a:t>?</a:t>
+              <a:t> main features</a:t>
             </a:r>
             <a:endParaRPr lang="en-US" sz="4000" cap="none" dirty="0"/>
           </a:p>
@@ -8328,9 +8426,7 @@
         </p:nvSpPr>
         <p:spPr/>
         <p:txBody>
-          <a:bodyPr>
-            <a:normAutofit fontScale="92500" lnSpcReduction="20000"/>
-          </a:bodyPr>
+          <a:bodyPr/>
           <a:lstStyle/>
           <a:p>
             <a:pPr>
@@ -8339,19 +8435,15 @@
             </a:pPr>
             <a:r>
               <a:rPr lang="en-US" dirty="0" smtClean="0"/>
-              <a:t> It’s </a:t>
-            </a:r>
-            <a:r>
-              <a:rPr lang="en-US" dirty="0" smtClean="0"/>
-              <a:t>fast - </a:t>
-            </a:r>
-            <a:r>
-              <a:rPr lang="en-US" dirty="0"/>
-              <a:t>Applying updates should not take longer than 3 </a:t>
-            </a:r>
-            <a:r>
-              <a:rPr lang="en-US" dirty="0" smtClean="0"/>
-              <a:t>seconds</a:t>
+              <a:t> Track </a:t>
+            </a:r>
+            <a:r>
+              <a:rPr lang="en-US" dirty="0"/>
+              <a:t>all your </a:t>
+            </a:r>
+            <a:r>
+              <a:rPr lang="en-US" dirty="0" smtClean="0"/>
+              <a:t>changes</a:t>
             </a:r>
           </a:p>
           <a:p>
@@ -8359,7 +8451,7 @@
               <a:buFont typeface="Wingdings" panose="05000000000000000000" pitchFamily="2" charset="2"/>
               <a:buChar char="q"/>
             </a:pPr>
-            <a:endParaRPr lang="en-US" dirty="0"/>
+            <a:endParaRPr lang="en-US" dirty="0" smtClean="0"/>
           </a:p>
           <a:p>
             <a:pPr>
@@ -8367,16 +8459,20 @@
               <a:buChar char="q"/>
             </a:pPr>
             <a:r>
-              <a:rPr lang="en-US" dirty="0" smtClean="0"/>
-              <a:t>  </a:t>
-            </a:r>
-            <a:r>
-              <a:rPr lang="en-US" dirty="0"/>
-              <a:t>You don’t need access to a </a:t>
-            </a:r>
-            <a:r>
-              <a:rPr lang="en-US" dirty="0" smtClean="0"/>
-              <a:t>server</a:t>
+              <a:rPr lang="en-US" dirty="0"/>
+              <a:t> </a:t>
+            </a:r>
+            <a:r>
+              <a:rPr lang="en-US" dirty="0" smtClean="0"/>
+              <a:t>Work </a:t>
+            </a:r>
+            <a:r>
+              <a:rPr lang="en-US" dirty="0"/>
+              <a:t>along with </a:t>
+            </a:r>
+            <a:r>
+              <a:rPr lang="en-US" dirty="0" smtClean="0"/>
+              <a:t>others</a:t>
             </a:r>
           </a:p>
           <a:p>
@@ -8393,94 +8489,11 @@
             </a:pPr>
             <a:r>
               <a:rPr lang="en-US" dirty="0" smtClean="0"/>
-              <a:t> Support </a:t>
-            </a:r>
-            <a:r>
-              <a:rPr lang="en-US" dirty="0"/>
-              <a:t>distributed system </a:t>
-            </a:r>
-            <a:r>
-              <a:rPr lang="en-US" dirty="0" smtClean="0"/>
-              <a:t>workflow</a:t>
-            </a:r>
-          </a:p>
-          <a:p>
-            <a:pPr>
-              <a:buFont typeface="Wingdings" panose="05000000000000000000" pitchFamily="2" charset="2"/>
-              <a:buChar char="q"/>
-            </a:pPr>
-            <a:endParaRPr lang="en-US" dirty="0"/>
-          </a:p>
-          <a:p>
-            <a:pPr>
-              <a:buFont typeface="Wingdings" panose="05000000000000000000" pitchFamily="2" charset="2"/>
-              <a:buChar char="q"/>
-            </a:pPr>
-            <a:r>
-              <a:rPr lang="en-US" dirty="0" smtClean="0"/>
-              <a:t> Amazingly </a:t>
-            </a:r>
-            <a:r>
-              <a:rPr lang="en-US" dirty="0"/>
-              <a:t>good at merging simultaneous </a:t>
-            </a:r>
-            <a:r>
-              <a:rPr lang="en-US" dirty="0" smtClean="0"/>
-              <a:t>changes</a:t>
-            </a:r>
-          </a:p>
-          <a:p>
-            <a:pPr>
-              <a:buFont typeface="Wingdings" panose="05000000000000000000" pitchFamily="2" charset="2"/>
-              <a:buChar char="q"/>
-            </a:pPr>
-            <a:endParaRPr lang="en-US" dirty="0" smtClean="0"/>
-          </a:p>
-          <a:p>
-            <a:pPr>
-              <a:buFont typeface="Wingdings" panose="05000000000000000000" pitchFamily="2" charset="2"/>
-              <a:buChar char="q"/>
-            </a:pPr>
-            <a:r>
-              <a:rPr lang="en-US" dirty="0" smtClean="0"/>
-              <a:t> Take </a:t>
-            </a:r>
-            <a:r>
-              <a:rPr lang="en-US" dirty="0" smtClean="0"/>
-              <a:t>the Concurrent </a:t>
-            </a:r>
-            <a:r>
-              <a:rPr lang="en-US" dirty="0"/>
-              <a:t>Version </a:t>
-            </a:r>
-            <a:r>
-              <a:rPr lang="en-US" dirty="0" smtClean="0"/>
-              <a:t>System</a:t>
-            </a:r>
-          </a:p>
-          <a:p>
-            <a:pPr>
-              <a:buFont typeface="Wingdings" panose="05000000000000000000" pitchFamily="2" charset="2"/>
-              <a:buChar char="q"/>
-            </a:pPr>
-            <a:endParaRPr lang="en-US" dirty="0"/>
-          </a:p>
-          <a:p>
-            <a:pPr>
-              <a:buFont typeface="Wingdings" panose="05000000000000000000" pitchFamily="2" charset="2"/>
-              <a:buChar char="q"/>
-            </a:pPr>
-            <a:r>
-              <a:rPr lang="en-US" dirty="0" smtClean="0"/>
-              <a:t> Almost </a:t>
-            </a:r>
-            <a:r>
-              <a:rPr lang="en-US" dirty="0" smtClean="0"/>
-              <a:t>every Software developer &amp; Engineers, data scientist  and using </a:t>
-            </a:r>
-            <a:r>
-              <a:rPr lang="en-US" dirty="0"/>
-              <a:t>it</a:t>
+              <a:t> Share </a:t>
+            </a:r>
+            <a:r>
+              <a:rPr lang="en-US" dirty="0"/>
+              <a:t>work with others</a:t>
             </a:r>
           </a:p>
         </p:txBody>
@@ -8488,7 +8501,7 @@
     </p:spTree>
     <p:extLst>
       <p:ext uri="{BB962C8B-B14F-4D97-AF65-F5344CB8AC3E}">
-        <p14:creationId xmlns:p14="http://schemas.microsoft.com/office/powerpoint/2010/main" val="401565576"/>
+        <p14:creationId xmlns:p14="http://schemas.microsoft.com/office/powerpoint/2010/main" val="4153249274"/>
       </p:ext>
     </p:extLst>
   </p:cSld>
@@ -8532,7 +8545,12 @@
             <p:ph type="title"/>
           </p:nvPr>
         </p:nvSpPr>
-        <p:spPr/>
+        <p:spPr>
+          <a:xfrm>
+            <a:off x="1069848" y="484632"/>
+            <a:ext cx="10058400" cy="1179276"/>
+          </a:xfrm>
+        </p:spPr>
         <p:txBody>
           <a:bodyPr>
             <a:normAutofit/>
@@ -8541,12 +8559,12 @@
           <a:p>
             <a:pPr algn="ctr"/>
             <a:r>
+              <a:rPr lang="en-US" sz="4000" cap="none" dirty="0" smtClean="0"/>
+              <a:t>What’s </a:t>
+            </a:r>
+            <a:r>
               <a:rPr lang="en-US" sz="4000" cap="none" dirty="0" err="1" smtClean="0"/>
-              <a:t>Git</a:t>
-            </a:r>
-            <a:r>
-              <a:rPr lang="en-US" sz="4000" cap="none" dirty="0" smtClean="0"/>
-              <a:t> main features</a:t>
+              <a:t>Github</a:t>
             </a:r>
             <a:endParaRPr lang="en-US" sz="4000" cap="none" dirty="0"/>
           </a:p>
@@ -8564,7 +8582,9 @@
         </p:nvSpPr>
         <p:spPr/>
         <p:txBody>
-          <a:bodyPr/>
+          <a:bodyPr>
+            <a:normAutofit/>
+          </a:bodyPr>
           <a:lstStyle/>
           <a:p>
             <a:pPr>
@@ -8573,73 +8593,43 @@
             </a:pPr>
             <a:r>
               <a:rPr lang="en-US" dirty="0" smtClean="0"/>
-              <a:t> Track </a:t>
-            </a:r>
-            <a:r>
-              <a:rPr lang="en-US" dirty="0"/>
-              <a:t>all your </a:t>
-            </a:r>
-            <a:r>
-              <a:rPr lang="en-US" dirty="0" smtClean="0"/>
-              <a:t>changes</a:t>
-            </a:r>
+              <a:t>.</a:t>
+            </a:r>
+            <a:endParaRPr lang="en-US" dirty="0"/>
           </a:p>
           <a:p>
             <a:pPr>
               <a:buFont typeface="Wingdings" panose="05000000000000000000" pitchFamily="2" charset="2"/>
               <a:buChar char="q"/>
             </a:pPr>
-            <a:endParaRPr lang="en-US" dirty="0" smtClean="0"/>
-          </a:p>
-          <a:p>
-            <a:pPr>
-              <a:buFont typeface="Wingdings" panose="05000000000000000000" pitchFamily="2" charset="2"/>
-              <a:buChar char="q"/>
-            </a:pPr>
+            <a:r>
+              <a:rPr lang="en-US" dirty="0" smtClean="0"/>
+              <a:t> Bitbucket.org </a:t>
+            </a:r>
+            <a:r>
+              <a:rPr lang="en-US" dirty="0"/>
+              <a:t>is an </a:t>
+            </a:r>
+            <a:r>
+              <a:rPr lang="en-US" dirty="0" smtClean="0"/>
+              <a:t>alternative</a:t>
+            </a:r>
             <a:r>
               <a:rPr lang="en-US" dirty="0"/>
               <a:t> </a:t>
             </a:r>
             <a:r>
               <a:rPr lang="en-US" dirty="0" smtClean="0"/>
-              <a:t>Work </a:t>
-            </a:r>
-            <a:r>
-              <a:rPr lang="en-US" dirty="0"/>
-              <a:t>along with </a:t>
-            </a:r>
-            <a:r>
-              <a:rPr lang="en-US" dirty="0" smtClean="0"/>
-              <a:t>others</a:t>
-            </a:r>
-          </a:p>
-          <a:p>
-            <a:pPr>
-              <a:buFont typeface="Wingdings" panose="05000000000000000000" pitchFamily="2" charset="2"/>
-              <a:buChar char="q"/>
-            </a:pPr>
-            <a:endParaRPr lang="en-US" dirty="0" smtClean="0"/>
-          </a:p>
-          <a:p>
-            <a:pPr>
-              <a:buFont typeface="Wingdings" panose="05000000000000000000" pitchFamily="2" charset="2"/>
-              <a:buChar char="q"/>
-            </a:pPr>
-            <a:r>
-              <a:rPr lang="en-US" dirty="0" smtClean="0"/>
-              <a:t> Share </a:t>
-            </a:r>
-            <a:r>
-              <a:rPr lang="en-US" dirty="0"/>
-              <a:t>work with others</a:t>
-            </a:r>
+              <a:t>– Free private repositories</a:t>
+            </a:r>
+            <a:endParaRPr lang="en-US" dirty="0"/>
           </a:p>
         </p:txBody>
       </p:sp>
     </p:spTree>
     <p:extLst>
       <p:ext uri="{BB962C8B-B14F-4D97-AF65-F5344CB8AC3E}">
-        <p14:creationId xmlns:p14="http://schemas.microsoft.com/office/powerpoint/2010/main" val="4153249274"/>
+        <p14:creationId xmlns:p14="http://schemas.microsoft.com/office/powerpoint/2010/main" val="868569010"/>
       </p:ext>
     </p:extLst>
   </p:cSld>
@@ -8693,11 +8683,15 @@
             <a:pPr algn="ctr"/>
             <a:r>
               <a:rPr lang="en-US" sz="4000" cap="none" dirty="0" smtClean="0"/>
-              <a:t>What’s </a:t>
+              <a:t>Why use </a:t>
             </a:r>
             <a:r>
               <a:rPr lang="en-US" sz="4000" cap="none" dirty="0" err="1" smtClean="0"/>
-              <a:t>Github</a:t>
+              <a:t>github</a:t>
+            </a:r>
+            <a:r>
+              <a:rPr lang="en-US" sz="4000" cap="none" dirty="0" smtClean="0"/>
+              <a:t> ?</a:t>
             </a:r>
             <a:endParaRPr lang="en-US" sz="4000" cap="none" dirty="0"/>
           </a:p>
@@ -8720,28 +8714,167 @@
           </a:bodyPr>
           <a:lstStyle/>
           <a:p>
+            <a:pPr>
+              <a:buFont typeface="Wingdings" panose="05000000000000000000" pitchFamily="2" charset="2"/>
+              <a:buChar char="q"/>
+            </a:pPr>
+            <a:r>
+              <a:rPr lang="en-US" dirty="0" smtClean="0"/>
+              <a:t>Having </a:t>
+            </a:r>
+            <a:r>
+              <a:rPr lang="en-US" dirty="0"/>
+              <a:t>a GitHub repo makes it easy for you to keep track of collaborative and personal projects</a:t>
+            </a:r>
+          </a:p>
+          <a:p>
+            <a:pPr lvl="1">
+              <a:buFont typeface="Wingdings" panose="05000000000000000000" pitchFamily="2" charset="2"/>
+              <a:buChar char="Ø"/>
+            </a:pPr>
+            <a:r>
+              <a:rPr lang="en-US" dirty="0" smtClean="0"/>
+              <a:t>GitHub </a:t>
+            </a:r>
+            <a:r>
+              <a:rPr lang="en-US" dirty="0"/>
+              <a:t>allows you to assign tasks to different users, making it clear who is responsible for which part of the </a:t>
+            </a:r>
+            <a:r>
+              <a:rPr lang="en-US" dirty="0" smtClean="0"/>
+              <a:t>analysis, feature of </a:t>
+            </a:r>
+            <a:r>
+              <a:rPr lang="en-US" smtClean="0"/>
+              <a:t>the project or code</a:t>
+            </a:r>
             <a:endParaRPr lang="en-US" dirty="0"/>
           </a:p>
           <a:p>
-            <a:r>
-              <a:rPr lang="en-US" dirty="0" smtClean="0"/>
-              <a:t>Bitbucket.org </a:t>
-            </a:r>
-            <a:r>
-              <a:rPr lang="en-US" dirty="0"/>
-              <a:t>is an </a:t>
-            </a:r>
-            <a:r>
-              <a:rPr lang="en-US" dirty="0" smtClean="0"/>
-              <a:t>alternative</a:t>
-            </a:r>
+            <a:pPr>
+              <a:buFont typeface="Wingdings" panose="05000000000000000000" pitchFamily="2" charset="2"/>
+              <a:buChar char="q"/>
+            </a:pPr>
+            <a:r>
+              <a:rPr lang="en-US" dirty="0" smtClean="0"/>
+              <a:t>  </a:t>
+            </a:r>
+            <a:r>
+              <a:rPr lang="en-US" dirty="0"/>
+              <a:t>Graphical user interface for </a:t>
+            </a:r>
+            <a:r>
+              <a:rPr lang="en-US" dirty="0" err="1" smtClean="0"/>
+              <a:t>git</a:t>
+            </a:r>
+            <a:endParaRPr lang="en-US" dirty="0"/>
+          </a:p>
+          <a:p>
+            <a:pPr lvl="1">
+              <a:buFont typeface="Wingdings" panose="05000000000000000000" pitchFamily="2" charset="2"/>
+              <a:buChar char="Ø"/>
+            </a:pPr>
             <a:r>
               <a:rPr lang="en-US" dirty="0"/>
               <a:t> </a:t>
             </a:r>
             <a:r>
               <a:rPr lang="en-US" dirty="0" smtClean="0"/>
-              <a:t>– Free private repositories</a:t>
+              <a:t>Exploring </a:t>
+            </a:r>
+            <a:r>
+              <a:rPr lang="en-US" dirty="0"/>
+              <a:t>code and its </a:t>
+            </a:r>
+            <a:r>
+              <a:rPr lang="en-US" dirty="0" smtClean="0"/>
+              <a:t>history</a:t>
+            </a:r>
+          </a:p>
+          <a:p>
+            <a:pPr lvl="1">
+              <a:buFont typeface="Wingdings" panose="05000000000000000000" pitchFamily="2" charset="2"/>
+              <a:buChar char="Ø"/>
+            </a:pPr>
+            <a:r>
+              <a:rPr lang="en-US" dirty="0" smtClean="0"/>
+              <a:t>Tracking issues</a:t>
+            </a:r>
+          </a:p>
+          <a:p>
+            <a:pPr lvl="1">
+              <a:buFont typeface="Wingdings" panose="05000000000000000000" pitchFamily="2" charset="2"/>
+              <a:buChar char="Ø"/>
+            </a:pPr>
+            <a:endParaRPr lang="en-US" dirty="0"/>
+          </a:p>
+          <a:p>
+            <a:pPr>
+              <a:buFont typeface="Wingdings" panose="05000000000000000000" pitchFamily="2" charset="2"/>
+              <a:buChar char="q"/>
+            </a:pPr>
+            <a:r>
+              <a:rPr lang="en-US" dirty="0"/>
+              <a:t> </a:t>
+            </a:r>
+            <a:r>
+              <a:rPr lang="en-US" dirty="0" smtClean="0"/>
+              <a:t>Facilitates:</a:t>
+            </a:r>
+            <a:endParaRPr lang="en-US" dirty="0"/>
+          </a:p>
+          <a:p>
+            <a:pPr lvl="1">
+              <a:buFont typeface="Wingdings" panose="05000000000000000000" pitchFamily="2" charset="2"/>
+              <a:buChar char="Ø"/>
+            </a:pPr>
+            <a:r>
+              <a:rPr lang="en-US" dirty="0" smtClean="0"/>
+              <a:t> Learning </a:t>
+            </a:r>
+            <a:r>
+              <a:rPr lang="en-US" dirty="0"/>
+              <a:t>from </a:t>
+            </a:r>
+            <a:r>
+              <a:rPr lang="en-US" dirty="0" smtClean="0"/>
+              <a:t>others</a:t>
+            </a:r>
+          </a:p>
+          <a:p>
+            <a:pPr lvl="1">
+              <a:buFont typeface="Wingdings" panose="05000000000000000000" pitchFamily="2" charset="2"/>
+              <a:buChar char="Ø"/>
+            </a:pPr>
+            <a:r>
+              <a:rPr lang="en-US" dirty="0" smtClean="0"/>
+              <a:t>  Seeing </a:t>
+            </a:r>
+            <a:r>
+              <a:rPr lang="en-US" dirty="0"/>
+              <a:t>what people are up </a:t>
+            </a:r>
+            <a:r>
+              <a:rPr lang="en-US" dirty="0" smtClean="0"/>
+              <a:t>to</a:t>
+            </a:r>
+          </a:p>
+          <a:p>
+            <a:pPr lvl="1">
+              <a:buFont typeface="Wingdings" panose="05000000000000000000" pitchFamily="2" charset="2"/>
+              <a:buChar char="Ø"/>
+            </a:pPr>
+            <a:r>
+              <a:rPr lang="en-US" dirty="0" smtClean="0"/>
+              <a:t> Contributing </a:t>
+            </a:r>
+            <a:r>
+              <a:rPr lang="en-US" dirty="0"/>
+              <a:t>to others’ </a:t>
+            </a:r>
+            <a:r>
+              <a:rPr lang="en-US" dirty="0" smtClean="0"/>
+              <a:t>code </a:t>
             </a:r>
             <a:endParaRPr lang="en-US" dirty="0"/>
           </a:p>
@@ -8750,7 +8883,7 @@
     </p:spTree>
     <p:extLst>
       <p:ext uri="{BB962C8B-B14F-4D97-AF65-F5344CB8AC3E}">
-        <p14:creationId xmlns:p14="http://schemas.microsoft.com/office/powerpoint/2010/main" val="868569010"/>
+        <p14:creationId xmlns:p14="http://schemas.microsoft.com/office/powerpoint/2010/main" val="4083448871"/>
       </p:ext>
     </p:extLst>
   </p:cSld>

</xml_diff>